<commit_message>
docu versiones y bbdd png
cambio a png bbdd
</commit_message>
<xml_diff>
--- a/DOCUMENTACION PROYECTO/presentacion YSTC.pptx
+++ b/DOCUMENTACION PROYECTO/presentacion YSTC.pptx
@@ -5,7 +5,7 @@
     <p:sldMasterId id="2147483648" r:id="rId1"/>
   </p:sldMasterIdLst>
   <p:notesMasterIdLst>
-    <p:notesMasterId r:id="rId33"/>
+    <p:notesMasterId r:id="rId35"/>
   </p:notesMasterIdLst>
   <p:sldIdLst>
     <p:sldId id="259" r:id="rId2"/>
@@ -21,24 +21,26 @@
     <p:sldId id="291" r:id="rId12"/>
     <p:sldId id="261" r:id="rId13"/>
     <p:sldId id="273" r:id="rId14"/>
-    <p:sldId id="262" r:id="rId15"/>
-    <p:sldId id="272" r:id="rId16"/>
-    <p:sldId id="263" r:id="rId17"/>
-    <p:sldId id="264" r:id="rId18"/>
-    <p:sldId id="277" r:id="rId19"/>
-    <p:sldId id="265" r:id="rId20"/>
-    <p:sldId id="276" r:id="rId21"/>
-    <p:sldId id="266" r:id="rId22"/>
-    <p:sldId id="275" r:id="rId23"/>
-    <p:sldId id="267" r:id="rId24"/>
-    <p:sldId id="282" r:id="rId25"/>
-    <p:sldId id="280" r:id="rId26"/>
-    <p:sldId id="268" r:id="rId27"/>
-    <p:sldId id="279" r:id="rId28"/>
-    <p:sldId id="292" r:id="rId29"/>
-    <p:sldId id="278" r:id="rId30"/>
-    <p:sldId id="274" r:id="rId31"/>
-    <p:sldId id="284" r:id="rId32"/>
+    <p:sldId id="294" r:id="rId15"/>
+    <p:sldId id="293" r:id="rId16"/>
+    <p:sldId id="262" r:id="rId17"/>
+    <p:sldId id="272" r:id="rId18"/>
+    <p:sldId id="263" r:id="rId19"/>
+    <p:sldId id="264" r:id="rId20"/>
+    <p:sldId id="277" r:id="rId21"/>
+    <p:sldId id="265" r:id="rId22"/>
+    <p:sldId id="276" r:id="rId23"/>
+    <p:sldId id="266" r:id="rId24"/>
+    <p:sldId id="275" r:id="rId25"/>
+    <p:sldId id="267" r:id="rId26"/>
+    <p:sldId id="282" r:id="rId27"/>
+    <p:sldId id="280" r:id="rId28"/>
+    <p:sldId id="268" r:id="rId29"/>
+    <p:sldId id="279" r:id="rId30"/>
+    <p:sldId id="292" r:id="rId31"/>
+    <p:sldId id="278" r:id="rId32"/>
+    <p:sldId id="274" r:id="rId33"/>
+    <p:sldId id="284" r:id="rId34"/>
   </p:sldIdLst>
   <p:sldSz cx="12192000" cy="6858000"/>
   <p:notesSz cx="6858000" cy="9144000"/>
@@ -227,7 +229,7 @@
           <a:p>
             <a:fld id="{1D98E58F-FA58-450E-86A0-9AB5F540E9A0}" type="datetimeFigureOut">
               <a:rPr lang="es-ES" smtClean="0"/>
-              <a:t>26/05/2018</a:t>
+              <a:t>03/06/2018</a:t>
             </a:fld>
             <a:endParaRPr lang="es-ES"/>
           </a:p>
@@ -1274,35 +1276,6 @@
           <a:bodyPr/>
           <a:lstStyle/>
           <a:p>
-            <a:pPr marL="0" marR="0" lvl="0" indent="0" algn="l" defTabSz="914400" rtl="0" eaLnBrk="1" fontAlgn="auto" latinLnBrk="0" hangingPunct="1">
-              <a:lnSpc>
-                <a:spcPct val="100000"/>
-              </a:lnSpc>
-              <a:spcBef>
-                <a:spcPts val="0"/>
-              </a:spcBef>
-              <a:spcAft>
-                <a:spcPts val="0"/>
-              </a:spcAft>
-              <a:buClrTx/>
-              <a:buSzTx/>
-              <a:buFontTx/>
-              <a:buNone/>
-              <a:tabLst/>
-              <a:defRPr/>
-            </a:pPr>
-            <a:r>
-              <a:rPr lang="es-ES_tradnl" sz="1200" kern="1200" dirty="0" err="1" smtClean="0">
-                <a:solidFill>
-                  <a:schemeClr val="tx1"/>
-                </a:solidFill>
-                <a:effectLst/>
-                <a:latin typeface="+mn-lt"/>
-                <a:ea typeface="+mn-ea"/>
-                <a:cs typeface="+mn-cs"/>
-              </a:rPr>
-              <a:t>MySQL</a:t>
-            </a:r>
             <a:r>
               <a:rPr lang="es-ES_tradnl" sz="1200" kern="1200" dirty="0" smtClean="0">
                 <a:solidFill>
@@ -1313,8 +1286,10 @@
                 <a:ea typeface="+mn-ea"/>
                 <a:cs typeface="+mn-cs"/>
               </a:rPr>
-              <a:t> ha sido el gestor de base de datos elegido debido a su facilidad de uso y a su ligereza que hacen de él la opción más utilizada para este tipo de proyectos Web.</a:t>
-            </a:r>
+              <a:t>Para llevar a cabo el patrón MVC creamos los DAO y los BO.</a:t>
+            </a:r>
+          </a:p>
+          <a:p>
             <a:endParaRPr lang="es-ES" sz="1200" kern="1200" dirty="0" smtClean="0">
               <a:solidFill>
                 <a:schemeClr val="tx1"/>
@@ -1326,6 +1301,18 @@
             </a:endParaRPr>
           </a:p>
           <a:p>
+            <a:r>
+              <a:rPr lang="es-ES_tradnl" sz="1200" kern="1200" dirty="0" smtClean="0">
+                <a:solidFill>
+                  <a:schemeClr val="tx1"/>
+                </a:solidFill>
+                <a:effectLst/>
+                <a:latin typeface="+mn-lt"/>
+                <a:ea typeface="+mn-ea"/>
+                <a:cs typeface="+mn-cs"/>
+              </a:rPr>
+              <a:t>A groso modo podemos decir que: el DAO es el que va a base de datos y se conecta con ella, </a:t>
+            </a:r>
             <a:endParaRPr lang="es-ES" dirty="0"/>
           </a:p>
         </p:txBody>
@@ -1356,7 +1343,7 @@
     </p:spTree>
     <p:extLst>
       <p:ext uri="{BB962C8B-B14F-4D97-AF65-F5344CB8AC3E}">
-        <p14:creationId xmlns:p14="http://schemas.microsoft.com/office/powerpoint/2010/main" val="3497186008"/>
+        <p14:creationId xmlns:p14="http://schemas.microsoft.com/office/powerpoint/2010/main" val="2449155211"/>
       </p:ext>
     </p:extLst>
   </p:cSld>
@@ -1420,32 +1407,22 @@
                 <a:ea typeface="+mn-ea"/>
                 <a:cs typeface="+mn-cs"/>
               </a:rPr>
-              <a:t>Una vez teníamos</a:t>
-            </a:r>
-            <a:r>
-              <a:rPr lang="es-ES_tradnl" sz="1200" kern="1200" baseline="0" dirty="0" smtClean="0">
-                <a:solidFill>
-                  <a:schemeClr val="tx1"/>
-                </a:solidFill>
-                <a:effectLst/>
-                <a:latin typeface="+mn-lt"/>
-                <a:ea typeface="+mn-ea"/>
-                <a:cs typeface="+mn-cs"/>
-              </a:rPr>
-              <a:t> claro que entidades serian necesarias para nuestro propósito, </a:t>
-            </a:r>
-            <a:r>
-              <a:rPr lang="es-ES_tradnl" sz="1200" kern="1200" dirty="0" smtClean="0">
-                <a:solidFill>
-                  <a:schemeClr val="tx1"/>
-                </a:solidFill>
-                <a:effectLst/>
-                <a:latin typeface="+mn-lt"/>
-                <a:ea typeface="+mn-ea"/>
-                <a:cs typeface="+mn-cs"/>
-              </a:rPr>
-              <a:t>realizamos un primer modelo entidad relación que posteriormente una vez acordado pasamos a modelo relacional y que finalmente se crea físicamente con el resultado que podemos ver en este esquema.</a:t>
-            </a:r>
+              <a:t>y el BO es el encargado de insertar, borrar, actualizar etc…contiene el esquema/propiedades de la Base de datos.</a:t>
+            </a:r>
+            <a:endParaRPr lang="es-ES" sz="1200" kern="1200" dirty="0" smtClean="0">
+              <a:solidFill>
+                <a:schemeClr val="tx1"/>
+              </a:solidFill>
+              <a:effectLst/>
+              <a:latin typeface="+mn-lt"/>
+              <a:ea typeface="+mn-ea"/>
+              <a:cs typeface="+mn-cs"/>
+            </a:endParaRPr>
+          </a:p>
+          <a:p>
+            <a:endParaRPr lang="es-ES" dirty="0" smtClean="0"/>
+          </a:p>
+          <a:p>
             <a:endParaRPr lang="es-ES" dirty="0"/>
           </a:p>
         </p:txBody>
@@ -1476,7 +1453,7 @@
     </p:spTree>
     <p:extLst>
       <p:ext uri="{BB962C8B-B14F-4D97-AF65-F5344CB8AC3E}">
-        <p14:creationId xmlns:p14="http://schemas.microsoft.com/office/powerpoint/2010/main" val="957838385"/>
+        <p14:creationId xmlns:p14="http://schemas.microsoft.com/office/powerpoint/2010/main" val="3964825300"/>
       </p:ext>
     </p:extLst>
   </p:cSld>
@@ -1548,6 +1525,262 @@
               <a:defRPr/>
             </a:pPr>
             <a:r>
+              <a:rPr lang="es-ES_tradnl" sz="1200" kern="1200" dirty="0" err="1" smtClean="0">
+                <a:solidFill>
+                  <a:schemeClr val="tx1"/>
+                </a:solidFill>
+                <a:effectLst/>
+                <a:latin typeface="+mn-lt"/>
+                <a:ea typeface="+mn-ea"/>
+                <a:cs typeface="+mn-cs"/>
+              </a:rPr>
+              <a:t>MySQL</a:t>
+            </a:r>
+            <a:r>
+              <a:rPr lang="es-ES_tradnl" sz="1200" kern="1200" dirty="0" smtClean="0">
+                <a:solidFill>
+                  <a:schemeClr val="tx1"/>
+                </a:solidFill>
+                <a:effectLst/>
+                <a:latin typeface="+mn-lt"/>
+                <a:ea typeface="+mn-ea"/>
+                <a:cs typeface="+mn-cs"/>
+              </a:rPr>
+              <a:t> ha sido el gestor de base de datos elegido debido a su facilidad de uso y a su ligereza que hacen de él la opción más utilizada para este tipo de proyectos Web.</a:t>
+            </a:r>
+            <a:endParaRPr lang="es-ES" sz="1200" kern="1200" dirty="0" smtClean="0">
+              <a:solidFill>
+                <a:schemeClr val="tx1"/>
+              </a:solidFill>
+              <a:effectLst/>
+              <a:latin typeface="+mn-lt"/>
+              <a:ea typeface="+mn-ea"/>
+              <a:cs typeface="+mn-cs"/>
+            </a:endParaRPr>
+          </a:p>
+          <a:p>
+            <a:endParaRPr lang="es-ES" dirty="0"/>
+          </a:p>
+        </p:txBody>
+      </p:sp>
+      <p:sp>
+        <p:nvSpPr>
+          <p:cNvPr id="4" name="Marcador de número de diapositiva 3"/>
+          <p:cNvSpPr>
+            <a:spLocks noGrp="1"/>
+          </p:cNvSpPr>
+          <p:nvPr>
+            <p:ph type="sldNum" sz="quarter" idx="10"/>
+          </p:nvPr>
+        </p:nvSpPr>
+        <p:spPr/>
+        <p:txBody>
+          <a:bodyPr/>
+          <a:lstStyle/>
+          <a:p>
+            <a:fld id="{DB7D0A05-FF74-4049-BC13-A9ACD9D2AB82}" type="slidenum">
+              <a:rPr lang="es-ES" smtClean="0"/>
+              <a:t>16</a:t>
+            </a:fld>
+            <a:endParaRPr lang="es-ES"/>
+          </a:p>
+        </p:txBody>
+      </p:sp>
+    </p:spTree>
+    <p:extLst>
+      <p:ext uri="{BB962C8B-B14F-4D97-AF65-F5344CB8AC3E}">
+        <p14:creationId xmlns:p14="http://schemas.microsoft.com/office/powerpoint/2010/main" val="3497186008"/>
+      </p:ext>
+    </p:extLst>
+  </p:cSld>
+  <p:clrMapOvr>
+    <a:masterClrMapping/>
+  </p:clrMapOvr>
+</p:notes>
+</file>
+
+<file path=ppt/notesSlides/notesSlide17.xml><?xml version="1.0" encoding="utf-8"?>
+<p:notes xmlns:a="http://schemas.openxmlformats.org/drawingml/2006/main" xmlns:r="http://schemas.openxmlformats.org/officeDocument/2006/relationships" xmlns:p="http://schemas.openxmlformats.org/presentationml/2006/main">
+  <p:cSld>
+    <p:spTree>
+      <p:nvGrpSpPr>
+        <p:cNvPr id="1" name=""/>
+        <p:cNvGrpSpPr/>
+        <p:nvPr/>
+      </p:nvGrpSpPr>
+      <p:grpSpPr>
+        <a:xfrm>
+          <a:off x="0" y="0"/>
+          <a:ext cx="0" cy="0"/>
+          <a:chOff x="0" y="0"/>
+          <a:chExt cx="0" cy="0"/>
+        </a:xfrm>
+      </p:grpSpPr>
+      <p:sp>
+        <p:nvSpPr>
+          <p:cNvPr id="2" name="Marcador de imagen de diapositiva 1"/>
+          <p:cNvSpPr>
+            <a:spLocks noGrp="1" noRot="1" noChangeAspect="1"/>
+          </p:cNvSpPr>
+          <p:nvPr>
+            <p:ph type="sldImg"/>
+          </p:nvPr>
+        </p:nvSpPr>
+        <p:spPr/>
+      </p:sp>
+      <p:sp>
+        <p:nvSpPr>
+          <p:cNvPr id="3" name="Marcador de notas 2"/>
+          <p:cNvSpPr>
+            <a:spLocks noGrp="1"/>
+          </p:cNvSpPr>
+          <p:nvPr>
+            <p:ph type="body" idx="1"/>
+          </p:nvPr>
+        </p:nvSpPr>
+        <p:spPr/>
+        <p:txBody>
+          <a:bodyPr/>
+          <a:lstStyle/>
+          <a:p>
+            <a:r>
+              <a:rPr lang="es-ES_tradnl" sz="1200" kern="1200" dirty="0" smtClean="0">
+                <a:solidFill>
+                  <a:schemeClr val="tx1"/>
+                </a:solidFill>
+                <a:effectLst/>
+                <a:latin typeface="+mn-lt"/>
+                <a:ea typeface="+mn-ea"/>
+                <a:cs typeface="+mn-cs"/>
+              </a:rPr>
+              <a:t>Una vez teníamos</a:t>
+            </a:r>
+            <a:r>
+              <a:rPr lang="es-ES_tradnl" sz="1200" kern="1200" baseline="0" dirty="0" smtClean="0">
+                <a:solidFill>
+                  <a:schemeClr val="tx1"/>
+                </a:solidFill>
+                <a:effectLst/>
+                <a:latin typeface="+mn-lt"/>
+                <a:ea typeface="+mn-ea"/>
+                <a:cs typeface="+mn-cs"/>
+              </a:rPr>
+              <a:t> claro que entidades serian necesarias para nuestro propósito, </a:t>
+            </a:r>
+            <a:r>
+              <a:rPr lang="es-ES_tradnl" sz="1200" kern="1200" dirty="0" smtClean="0">
+                <a:solidFill>
+                  <a:schemeClr val="tx1"/>
+                </a:solidFill>
+                <a:effectLst/>
+                <a:latin typeface="+mn-lt"/>
+                <a:ea typeface="+mn-ea"/>
+                <a:cs typeface="+mn-cs"/>
+              </a:rPr>
+              <a:t>realizamos un primer modelo entidad relación que posteriormente una vez acordado pasamos a modelo relacional y que finalmente se crea físicamente con el resultado que podemos ver en este esquema.</a:t>
+            </a:r>
+            <a:endParaRPr lang="es-ES" dirty="0"/>
+          </a:p>
+        </p:txBody>
+      </p:sp>
+      <p:sp>
+        <p:nvSpPr>
+          <p:cNvPr id="4" name="Marcador de número de diapositiva 3"/>
+          <p:cNvSpPr>
+            <a:spLocks noGrp="1"/>
+          </p:cNvSpPr>
+          <p:nvPr>
+            <p:ph type="sldNum" sz="quarter" idx="10"/>
+          </p:nvPr>
+        </p:nvSpPr>
+        <p:spPr/>
+        <p:txBody>
+          <a:bodyPr/>
+          <a:lstStyle/>
+          <a:p>
+            <a:fld id="{DB7D0A05-FF74-4049-BC13-A9ACD9D2AB82}" type="slidenum">
+              <a:rPr lang="es-ES" smtClean="0"/>
+              <a:t>17</a:t>
+            </a:fld>
+            <a:endParaRPr lang="es-ES"/>
+          </a:p>
+        </p:txBody>
+      </p:sp>
+    </p:spTree>
+    <p:extLst>
+      <p:ext uri="{BB962C8B-B14F-4D97-AF65-F5344CB8AC3E}">
+        <p14:creationId xmlns:p14="http://schemas.microsoft.com/office/powerpoint/2010/main" val="957838385"/>
+      </p:ext>
+    </p:extLst>
+  </p:cSld>
+  <p:clrMapOvr>
+    <a:masterClrMapping/>
+  </p:clrMapOvr>
+</p:notes>
+</file>
+
+<file path=ppt/notesSlides/notesSlide18.xml><?xml version="1.0" encoding="utf-8"?>
+<p:notes xmlns:a="http://schemas.openxmlformats.org/drawingml/2006/main" xmlns:r="http://schemas.openxmlformats.org/officeDocument/2006/relationships" xmlns:p="http://schemas.openxmlformats.org/presentationml/2006/main">
+  <p:cSld>
+    <p:spTree>
+      <p:nvGrpSpPr>
+        <p:cNvPr id="1" name=""/>
+        <p:cNvGrpSpPr/>
+        <p:nvPr/>
+      </p:nvGrpSpPr>
+      <p:grpSpPr>
+        <a:xfrm>
+          <a:off x="0" y="0"/>
+          <a:ext cx="0" cy="0"/>
+          <a:chOff x="0" y="0"/>
+          <a:chExt cx="0" cy="0"/>
+        </a:xfrm>
+      </p:grpSpPr>
+      <p:sp>
+        <p:nvSpPr>
+          <p:cNvPr id="2" name="Marcador de imagen de diapositiva 1"/>
+          <p:cNvSpPr>
+            <a:spLocks noGrp="1" noRot="1" noChangeAspect="1"/>
+          </p:cNvSpPr>
+          <p:nvPr>
+            <p:ph type="sldImg"/>
+          </p:nvPr>
+        </p:nvSpPr>
+        <p:spPr/>
+      </p:sp>
+      <p:sp>
+        <p:nvSpPr>
+          <p:cNvPr id="3" name="Marcador de notas 2"/>
+          <p:cNvSpPr>
+            <a:spLocks noGrp="1"/>
+          </p:cNvSpPr>
+          <p:nvPr>
+            <p:ph type="body" idx="1"/>
+          </p:nvPr>
+        </p:nvSpPr>
+        <p:spPr/>
+        <p:txBody>
+          <a:bodyPr/>
+          <a:lstStyle/>
+          <a:p>
+            <a:pPr marL="0" marR="0" lvl="0" indent="0" algn="l" defTabSz="914400" rtl="0" eaLnBrk="1" fontAlgn="auto" latinLnBrk="0" hangingPunct="1">
+              <a:lnSpc>
+                <a:spcPct val="100000"/>
+              </a:lnSpc>
+              <a:spcBef>
+                <a:spcPts val="0"/>
+              </a:spcBef>
+              <a:spcAft>
+                <a:spcPts val="0"/>
+              </a:spcAft>
+              <a:buClrTx/>
+              <a:buSzTx/>
+              <a:buFontTx/>
+              <a:buNone/>
+              <a:tabLst/>
+              <a:defRPr/>
+            </a:pPr>
+            <a:r>
               <a:rPr lang="es-ES_tradnl" sz="1200" kern="1200" dirty="0" smtClean="0">
                 <a:solidFill>
                   <a:schemeClr val="tx1"/>
@@ -1733,7 +1966,7 @@
           <a:p>
             <a:fld id="{DB7D0A05-FF74-4049-BC13-A9ACD9D2AB82}" type="slidenum">
               <a:rPr lang="es-ES" smtClean="0"/>
-              <a:t>16</a:t>
+              <a:t>18</a:t>
             </a:fld>
             <a:endParaRPr lang="es-ES"/>
           </a:p>
@@ -1743,226 +1976,6 @@
     <p:extLst>
       <p:ext uri="{BB962C8B-B14F-4D97-AF65-F5344CB8AC3E}">
         <p14:creationId xmlns:p14="http://schemas.microsoft.com/office/powerpoint/2010/main" val="2828250095"/>
-      </p:ext>
-    </p:extLst>
-  </p:cSld>
-  <p:clrMapOvr>
-    <a:masterClrMapping/>
-  </p:clrMapOvr>
-</p:notes>
-</file>
-
-<file path=ppt/notesSlides/notesSlide17.xml><?xml version="1.0" encoding="utf-8"?>
-<p:notes xmlns:a="http://schemas.openxmlformats.org/drawingml/2006/main" xmlns:r="http://schemas.openxmlformats.org/officeDocument/2006/relationships" xmlns:p="http://schemas.openxmlformats.org/presentationml/2006/main">
-  <p:cSld>
-    <p:spTree>
-      <p:nvGrpSpPr>
-        <p:cNvPr id="1" name=""/>
-        <p:cNvGrpSpPr/>
-        <p:nvPr/>
-      </p:nvGrpSpPr>
-      <p:grpSpPr>
-        <a:xfrm>
-          <a:off x="0" y="0"/>
-          <a:ext cx="0" cy="0"/>
-          <a:chOff x="0" y="0"/>
-          <a:chExt cx="0" cy="0"/>
-        </a:xfrm>
-      </p:grpSpPr>
-      <p:sp>
-        <p:nvSpPr>
-          <p:cNvPr id="2" name="Marcador de imagen de diapositiva 1"/>
-          <p:cNvSpPr>
-            <a:spLocks noGrp="1" noRot="1" noChangeAspect="1"/>
-          </p:cNvSpPr>
-          <p:nvPr>
-            <p:ph type="sldImg"/>
-          </p:nvPr>
-        </p:nvSpPr>
-        <p:spPr/>
-      </p:sp>
-      <p:sp>
-        <p:nvSpPr>
-          <p:cNvPr id="3" name="Marcador de notas 2"/>
-          <p:cNvSpPr>
-            <a:spLocks noGrp="1"/>
-          </p:cNvSpPr>
-          <p:nvPr>
-            <p:ph type="body" idx="1"/>
-          </p:nvPr>
-        </p:nvSpPr>
-        <p:spPr/>
-        <p:txBody>
-          <a:bodyPr/>
-          <a:lstStyle/>
-          <a:p>
-            <a:pPr marL="0" marR="0" lvl="0" indent="0" algn="l" defTabSz="914400" rtl="0" eaLnBrk="1" fontAlgn="auto" latinLnBrk="0" hangingPunct="1">
-              <a:lnSpc>
-                <a:spcPct val="100000"/>
-              </a:lnSpc>
-              <a:spcBef>
-                <a:spcPts val="0"/>
-              </a:spcBef>
-              <a:spcAft>
-                <a:spcPts val="0"/>
-              </a:spcAft>
-              <a:buClrTx/>
-              <a:buSzTx/>
-              <a:buFontTx/>
-              <a:buNone/>
-              <a:tabLst/>
-              <a:defRPr/>
-            </a:pPr>
-            <a:r>
-              <a:rPr lang="es-ES_tradnl" sz="1200" kern="1200" dirty="0" smtClean="0">
-                <a:solidFill>
-                  <a:schemeClr val="tx1"/>
-                </a:solidFill>
-                <a:effectLst/>
-                <a:latin typeface="+mn-lt"/>
-                <a:ea typeface="+mn-ea"/>
-                <a:cs typeface="+mn-cs"/>
-              </a:rPr>
-              <a:t>Librería de estilos creada y liberada por Twitter con una gran popularidad y aceptación en el mundo del diseño web gracias a las facilidades que aporta y que usamos en el proyecto como es su sistema de rejilla.</a:t>
-            </a:r>
-            <a:endParaRPr lang="es-ES" sz="1200" kern="1200" dirty="0" smtClean="0">
-              <a:solidFill>
-                <a:schemeClr val="tx1"/>
-              </a:solidFill>
-              <a:effectLst/>
-              <a:latin typeface="+mn-lt"/>
-              <a:ea typeface="+mn-ea"/>
-              <a:cs typeface="+mn-cs"/>
-            </a:endParaRPr>
-          </a:p>
-          <a:p>
-            <a:endParaRPr lang="es-ES" dirty="0"/>
-          </a:p>
-        </p:txBody>
-      </p:sp>
-      <p:sp>
-        <p:nvSpPr>
-          <p:cNvPr id="4" name="Marcador de número de diapositiva 3"/>
-          <p:cNvSpPr>
-            <a:spLocks noGrp="1"/>
-          </p:cNvSpPr>
-          <p:nvPr>
-            <p:ph type="sldNum" sz="quarter" idx="10"/>
-          </p:nvPr>
-        </p:nvSpPr>
-        <p:spPr/>
-        <p:txBody>
-          <a:bodyPr/>
-          <a:lstStyle/>
-          <a:p>
-            <a:fld id="{DB7D0A05-FF74-4049-BC13-A9ACD9D2AB82}" type="slidenum">
-              <a:rPr lang="es-ES" smtClean="0"/>
-              <a:t>17</a:t>
-            </a:fld>
-            <a:endParaRPr lang="es-ES"/>
-          </a:p>
-        </p:txBody>
-      </p:sp>
-    </p:spTree>
-    <p:extLst>
-      <p:ext uri="{BB962C8B-B14F-4D97-AF65-F5344CB8AC3E}">
-        <p14:creationId xmlns:p14="http://schemas.microsoft.com/office/powerpoint/2010/main" val="429507329"/>
-      </p:ext>
-    </p:extLst>
-  </p:cSld>
-  <p:clrMapOvr>
-    <a:masterClrMapping/>
-  </p:clrMapOvr>
-</p:notes>
-</file>
-
-<file path=ppt/notesSlides/notesSlide18.xml><?xml version="1.0" encoding="utf-8"?>
-<p:notes xmlns:a="http://schemas.openxmlformats.org/drawingml/2006/main" xmlns:r="http://schemas.openxmlformats.org/officeDocument/2006/relationships" xmlns:p="http://schemas.openxmlformats.org/presentationml/2006/main">
-  <p:cSld>
-    <p:spTree>
-      <p:nvGrpSpPr>
-        <p:cNvPr id="1" name=""/>
-        <p:cNvGrpSpPr/>
-        <p:nvPr/>
-      </p:nvGrpSpPr>
-      <p:grpSpPr>
-        <a:xfrm>
-          <a:off x="0" y="0"/>
-          <a:ext cx="0" cy="0"/>
-          <a:chOff x="0" y="0"/>
-          <a:chExt cx="0" cy="0"/>
-        </a:xfrm>
-      </p:grpSpPr>
-      <p:sp>
-        <p:nvSpPr>
-          <p:cNvPr id="2" name="Marcador de imagen de diapositiva 1"/>
-          <p:cNvSpPr>
-            <a:spLocks noGrp="1" noRot="1" noChangeAspect="1"/>
-          </p:cNvSpPr>
-          <p:nvPr>
-            <p:ph type="sldImg"/>
-          </p:nvPr>
-        </p:nvSpPr>
-        <p:spPr/>
-      </p:sp>
-      <p:sp>
-        <p:nvSpPr>
-          <p:cNvPr id="3" name="Marcador de notas 2"/>
-          <p:cNvSpPr>
-            <a:spLocks noGrp="1"/>
-          </p:cNvSpPr>
-          <p:nvPr>
-            <p:ph type="body" idx="1"/>
-          </p:nvPr>
-        </p:nvSpPr>
-        <p:spPr/>
-        <p:txBody>
-          <a:bodyPr/>
-          <a:lstStyle/>
-          <a:p>
-            <a:r>
-              <a:rPr lang="es-ES" dirty="0" smtClean="0"/>
-              <a:t>Aquí vemos como hemos hecho uso del sistema de rejilla de </a:t>
-            </a:r>
-            <a:r>
-              <a:rPr lang="es-ES" dirty="0" err="1" smtClean="0"/>
-              <a:t>bootstrap</a:t>
-            </a:r>
-            <a:r>
-              <a:rPr lang="es-ES" dirty="0" smtClean="0"/>
-              <a:t>.</a:t>
-            </a:r>
-            <a:endParaRPr lang="es-ES" dirty="0"/>
-          </a:p>
-        </p:txBody>
-      </p:sp>
-      <p:sp>
-        <p:nvSpPr>
-          <p:cNvPr id="4" name="Marcador de número de diapositiva 3"/>
-          <p:cNvSpPr>
-            <a:spLocks noGrp="1"/>
-          </p:cNvSpPr>
-          <p:nvPr>
-            <p:ph type="sldNum" sz="quarter" idx="10"/>
-          </p:nvPr>
-        </p:nvSpPr>
-        <p:spPr/>
-        <p:txBody>
-          <a:bodyPr/>
-          <a:lstStyle/>
-          <a:p>
-            <a:fld id="{DB7D0A05-FF74-4049-BC13-A9ACD9D2AB82}" type="slidenum">
-              <a:rPr lang="es-ES" smtClean="0"/>
-              <a:t>18</a:t>
-            </a:fld>
-            <a:endParaRPr lang="es-ES"/>
-          </a:p>
-        </p:txBody>
-      </p:sp>
-    </p:spTree>
-    <p:extLst>
-      <p:ext uri="{BB962C8B-B14F-4D97-AF65-F5344CB8AC3E}">
-        <p14:creationId xmlns:p14="http://schemas.microsoft.com/office/powerpoint/2010/main" val="1732749248"/>
       </p:ext>
     </p:extLst>
   </p:cSld>
@@ -2043,7 +2056,7 @@
                 <a:ea typeface="+mn-ea"/>
                 <a:cs typeface="+mn-cs"/>
               </a:rPr>
-              <a:t>Encargado de generar HTML dinámicamente y elegido por su rapidez y sencillez en cuanto a código para realizar dicha tarea.</a:t>
+              <a:t>Librería de estilos creada y liberada por Twitter con una gran popularidad y aceptación en el mundo del diseño web gracias a las facilidades que aporta y que usamos en el proyecto como es su sistema de rejilla.</a:t>
             </a:r>
             <a:endParaRPr lang="es-ES" sz="1200" kern="1200" dirty="0" smtClean="0">
               <a:solidFill>
@@ -2086,7 +2099,7 @@
     </p:spTree>
     <p:extLst>
       <p:ext uri="{BB962C8B-B14F-4D97-AF65-F5344CB8AC3E}">
-        <p14:creationId xmlns:p14="http://schemas.microsoft.com/office/powerpoint/2010/main" val="1775177090"/>
+        <p14:creationId xmlns:p14="http://schemas.microsoft.com/office/powerpoint/2010/main" val="429507329"/>
       </p:ext>
     </p:extLst>
   </p:cSld>
@@ -2386,11 +2399,15 @@
           <a:p>
             <a:r>
               <a:rPr lang="es-ES" dirty="0" smtClean="0"/>
-              <a:t>Aquí</a:t>
-            </a:r>
-            <a:r>
-              <a:rPr lang="es-ES" baseline="0" dirty="0" smtClean="0"/>
-              <a:t> tenemos un ejemplo de como generamos HTML dinámicamente mediante JQUERY</a:t>
+              <a:t>Aquí vemos como hemos hecho uso del sistema de rejilla de </a:t>
+            </a:r>
+            <a:r>
+              <a:rPr lang="es-ES" dirty="0" err="1" smtClean="0"/>
+              <a:t>bootstrap</a:t>
+            </a:r>
+            <a:r>
+              <a:rPr lang="es-ES" dirty="0" smtClean="0"/>
+              <a:t>.</a:t>
             </a:r>
             <a:endParaRPr lang="es-ES" dirty="0"/>
           </a:p>
@@ -2422,7 +2439,7 @@
     </p:spTree>
     <p:extLst>
       <p:ext uri="{BB962C8B-B14F-4D97-AF65-F5344CB8AC3E}">
-        <p14:creationId xmlns:p14="http://schemas.microsoft.com/office/powerpoint/2010/main" val="1512199226"/>
+        <p14:creationId xmlns:p14="http://schemas.microsoft.com/office/powerpoint/2010/main" val="1732749248"/>
       </p:ext>
     </p:extLst>
   </p:cSld>
@@ -2503,7 +2520,7 @@
                 <a:ea typeface="+mn-ea"/>
                 <a:cs typeface="+mn-cs"/>
               </a:rPr>
-              <a:t>Utilizado para evitar las recargas de la web a la hora de filtrar en las búsquedas.</a:t>
+              <a:t>Encargado de generar HTML dinámicamente y elegido por su rapidez y sencillez en cuanto a código para realizar dicha tarea.</a:t>
             </a:r>
             <a:endParaRPr lang="es-ES" sz="1200" kern="1200" dirty="0" smtClean="0">
               <a:solidFill>
@@ -2546,7 +2563,7 @@
     </p:spTree>
     <p:extLst>
       <p:ext uri="{BB962C8B-B14F-4D97-AF65-F5344CB8AC3E}">
-        <p14:creationId xmlns:p14="http://schemas.microsoft.com/office/powerpoint/2010/main" val="1234860430"/>
+        <p14:creationId xmlns:p14="http://schemas.microsoft.com/office/powerpoint/2010/main" val="1775177090"/>
       </p:ext>
     </p:extLst>
   </p:cSld>
@@ -2602,11 +2619,11 @@
           <a:p>
             <a:r>
               <a:rPr lang="es-ES" dirty="0" smtClean="0"/>
-              <a:t>Este es un ejemplo de llamadas AJAX durante la selección</a:t>
+              <a:t>Aquí</a:t>
             </a:r>
             <a:r>
               <a:rPr lang="es-ES" baseline="0" dirty="0" smtClean="0"/>
-              <a:t> de los distintos filtros de las paginas web de los cines.</a:t>
+              <a:t> tenemos un ejemplo de como generamos HTML dinámicamente mediante JQUERY</a:t>
             </a:r>
             <a:endParaRPr lang="es-ES" dirty="0"/>
           </a:p>
@@ -2638,7 +2655,7 @@
     </p:spTree>
     <p:extLst>
       <p:ext uri="{BB962C8B-B14F-4D97-AF65-F5344CB8AC3E}">
-        <p14:creationId xmlns:p14="http://schemas.microsoft.com/office/powerpoint/2010/main" val="708013584"/>
+        <p14:creationId xmlns:p14="http://schemas.microsoft.com/office/powerpoint/2010/main" val="1512199226"/>
       </p:ext>
     </p:extLst>
   </p:cSld>
@@ -2710,18 +2727,6 @@
               <a:defRPr/>
             </a:pPr>
             <a:r>
-              <a:rPr lang="es-ES_tradnl" sz="1200" kern="1200" dirty="0" err="1" smtClean="0">
-                <a:solidFill>
-                  <a:schemeClr val="tx1"/>
-                </a:solidFill>
-                <a:effectLst/>
-                <a:latin typeface="+mn-lt"/>
-                <a:ea typeface="+mn-ea"/>
-                <a:cs typeface="+mn-cs"/>
-              </a:rPr>
-              <a:t>Trello</a:t>
-            </a:r>
-            <a:r>
               <a:rPr lang="es-ES_tradnl" sz="1200" kern="1200" dirty="0" smtClean="0">
                 <a:solidFill>
                   <a:schemeClr val="tx1"/>
@@ -2731,7 +2736,7 @@
                 <a:ea typeface="+mn-ea"/>
                 <a:cs typeface="+mn-cs"/>
               </a:rPr>
-              <a:t> es una aplicación Web la cual te proporciona un sistema de trabajo basado en metodologías agiles.</a:t>
+              <a:t>Utilizado para evitar las recargas de la web a la hora de filtrar en las búsquedas.</a:t>
             </a:r>
             <a:endParaRPr lang="es-ES" sz="1200" kern="1200" dirty="0" smtClean="0">
               <a:solidFill>
@@ -2774,7 +2779,7 @@
     </p:spTree>
     <p:extLst>
       <p:ext uri="{BB962C8B-B14F-4D97-AF65-F5344CB8AC3E}">
-        <p14:creationId xmlns:p14="http://schemas.microsoft.com/office/powerpoint/2010/main" val="1050634970"/>
+        <p14:creationId xmlns:p14="http://schemas.microsoft.com/office/powerpoint/2010/main" val="1234860430"/>
       </p:ext>
     </p:extLst>
   </p:cSld>
@@ -2828,6 +2833,234 @@
           <a:bodyPr/>
           <a:lstStyle/>
           <a:p>
+            <a:r>
+              <a:rPr lang="es-ES" dirty="0" smtClean="0"/>
+              <a:t>Este es un ejemplo de llamadas AJAX durante la selección</a:t>
+            </a:r>
+            <a:r>
+              <a:rPr lang="es-ES" baseline="0" dirty="0" smtClean="0"/>
+              <a:t> de los distintos filtros de las paginas web de los cines.</a:t>
+            </a:r>
+            <a:endParaRPr lang="es-ES" dirty="0"/>
+          </a:p>
+        </p:txBody>
+      </p:sp>
+      <p:sp>
+        <p:nvSpPr>
+          <p:cNvPr id="4" name="Marcador de número de diapositiva 3"/>
+          <p:cNvSpPr>
+            <a:spLocks noGrp="1"/>
+          </p:cNvSpPr>
+          <p:nvPr>
+            <p:ph type="sldNum" sz="quarter" idx="10"/>
+          </p:nvPr>
+        </p:nvSpPr>
+        <p:spPr/>
+        <p:txBody>
+          <a:bodyPr/>
+          <a:lstStyle/>
+          <a:p>
+            <a:fld id="{DB7D0A05-FF74-4049-BC13-A9ACD9D2AB82}" type="slidenum">
+              <a:rPr lang="es-ES" smtClean="0"/>
+              <a:t>24</a:t>
+            </a:fld>
+            <a:endParaRPr lang="es-ES"/>
+          </a:p>
+        </p:txBody>
+      </p:sp>
+    </p:spTree>
+    <p:extLst>
+      <p:ext uri="{BB962C8B-B14F-4D97-AF65-F5344CB8AC3E}">
+        <p14:creationId xmlns:p14="http://schemas.microsoft.com/office/powerpoint/2010/main" val="708013584"/>
+      </p:ext>
+    </p:extLst>
+  </p:cSld>
+  <p:clrMapOvr>
+    <a:masterClrMapping/>
+  </p:clrMapOvr>
+</p:notes>
+</file>
+
+<file path=ppt/notesSlides/notesSlide25.xml><?xml version="1.0" encoding="utf-8"?>
+<p:notes xmlns:a="http://schemas.openxmlformats.org/drawingml/2006/main" xmlns:r="http://schemas.openxmlformats.org/officeDocument/2006/relationships" xmlns:p="http://schemas.openxmlformats.org/presentationml/2006/main">
+  <p:cSld>
+    <p:spTree>
+      <p:nvGrpSpPr>
+        <p:cNvPr id="1" name=""/>
+        <p:cNvGrpSpPr/>
+        <p:nvPr/>
+      </p:nvGrpSpPr>
+      <p:grpSpPr>
+        <a:xfrm>
+          <a:off x="0" y="0"/>
+          <a:ext cx="0" cy="0"/>
+          <a:chOff x="0" y="0"/>
+          <a:chExt cx="0" cy="0"/>
+        </a:xfrm>
+      </p:grpSpPr>
+      <p:sp>
+        <p:nvSpPr>
+          <p:cNvPr id="2" name="Marcador de imagen de diapositiva 1"/>
+          <p:cNvSpPr>
+            <a:spLocks noGrp="1" noRot="1" noChangeAspect="1"/>
+          </p:cNvSpPr>
+          <p:nvPr>
+            <p:ph type="sldImg"/>
+          </p:nvPr>
+        </p:nvSpPr>
+        <p:spPr/>
+      </p:sp>
+      <p:sp>
+        <p:nvSpPr>
+          <p:cNvPr id="3" name="Marcador de notas 2"/>
+          <p:cNvSpPr>
+            <a:spLocks noGrp="1"/>
+          </p:cNvSpPr>
+          <p:nvPr>
+            <p:ph type="body" idx="1"/>
+          </p:nvPr>
+        </p:nvSpPr>
+        <p:spPr/>
+        <p:txBody>
+          <a:bodyPr/>
+          <a:lstStyle/>
+          <a:p>
+            <a:pPr marL="0" marR="0" lvl="0" indent="0" algn="l" defTabSz="914400" rtl="0" eaLnBrk="1" fontAlgn="auto" latinLnBrk="0" hangingPunct="1">
+              <a:lnSpc>
+                <a:spcPct val="100000"/>
+              </a:lnSpc>
+              <a:spcBef>
+                <a:spcPts val="0"/>
+              </a:spcBef>
+              <a:spcAft>
+                <a:spcPts val="0"/>
+              </a:spcAft>
+              <a:buClrTx/>
+              <a:buSzTx/>
+              <a:buFontTx/>
+              <a:buNone/>
+              <a:tabLst/>
+              <a:defRPr/>
+            </a:pPr>
+            <a:r>
+              <a:rPr lang="es-ES_tradnl" sz="1200" kern="1200" dirty="0" err="1" smtClean="0">
+                <a:solidFill>
+                  <a:schemeClr val="tx1"/>
+                </a:solidFill>
+                <a:effectLst/>
+                <a:latin typeface="+mn-lt"/>
+                <a:ea typeface="+mn-ea"/>
+                <a:cs typeface="+mn-cs"/>
+              </a:rPr>
+              <a:t>Trello</a:t>
+            </a:r>
+            <a:r>
+              <a:rPr lang="es-ES_tradnl" sz="1200" kern="1200" dirty="0" smtClean="0">
+                <a:solidFill>
+                  <a:schemeClr val="tx1"/>
+                </a:solidFill>
+                <a:effectLst/>
+                <a:latin typeface="+mn-lt"/>
+                <a:ea typeface="+mn-ea"/>
+                <a:cs typeface="+mn-cs"/>
+              </a:rPr>
+              <a:t> es una aplicación Web la cual te proporciona un sistema de trabajo basado en metodologías agiles.</a:t>
+            </a:r>
+            <a:endParaRPr lang="es-ES" sz="1200" kern="1200" dirty="0" smtClean="0">
+              <a:solidFill>
+                <a:schemeClr val="tx1"/>
+              </a:solidFill>
+              <a:effectLst/>
+              <a:latin typeface="+mn-lt"/>
+              <a:ea typeface="+mn-ea"/>
+              <a:cs typeface="+mn-cs"/>
+            </a:endParaRPr>
+          </a:p>
+          <a:p>
+            <a:endParaRPr lang="es-ES" dirty="0"/>
+          </a:p>
+        </p:txBody>
+      </p:sp>
+      <p:sp>
+        <p:nvSpPr>
+          <p:cNvPr id="4" name="Marcador de número de diapositiva 3"/>
+          <p:cNvSpPr>
+            <a:spLocks noGrp="1"/>
+          </p:cNvSpPr>
+          <p:nvPr>
+            <p:ph type="sldNum" sz="quarter" idx="10"/>
+          </p:nvPr>
+        </p:nvSpPr>
+        <p:spPr/>
+        <p:txBody>
+          <a:bodyPr/>
+          <a:lstStyle/>
+          <a:p>
+            <a:fld id="{DB7D0A05-FF74-4049-BC13-A9ACD9D2AB82}" type="slidenum">
+              <a:rPr lang="es-ES" smtClean="0"/>
+              <a:t>25</a:t>
+            </a:fld>
+            <a:endParaRPr lang="es-ES"/>
+          </a:p>
+        </p:txBody>
+      </p:sp>
+    </p:spTree>
+    <p:extLst>
+      <p:ext uri="{BB962C8B-B14F-4D97-AF65-F5344CB8AC3E}">
+        <p14:creationId xmlns:p14="http://schemas.microsoft.com/office/powerpoint/2010/main" val="1050634970"/>
+      </p:ext>
+    </p:extLst>
+  </p:cSld>
+  <p:clrMapOvr>
+    <a:masterClrMapping/>
+  </p:clrMapOvr>
+</p:notes>
+</file>
+
+<file path=ppt/notesSlides/notesSlide26.xml><?xml version="1.0" encoding="utf-8"?>
+<p:notes xmlns:a="http://schemas.openxmlformats.org/drawingml/2006/main" xmlns:r="http://schemas.openxmlformats.org/officeDocument/2006/relationships" xmlns:p="http://schemas.openxmlformats.org/presentationml/2006/main">
+  <p:cSld>
+    <p:spTree>
+      <p:nvGrpSpPr>
+        <p:cNvPr id="1" name=""/>
+        <p:cNvGrpSpPr/>
+        <p:nvPr/>
+      </p:nvGrpSpPr>
+      <p:grpSpPr>
+        <a:xfrm>
+          <a:off x="0" y="0"/>
+          <a:ext cx="0" cy="0"/>
+          <a:chOff x="0" y="0"/>
+          <a:chExt cx="0" cy="0"/>
+        </a:xfrm>
+      </p:grpSpPr>
+      <p:sp>
+        <p:nvSpPr>
+          <p:cNvPr id="2" name="Marcador de imagen de diapositiva 1"/>
+          <p:cNvSpPr>
+            <a:spLocks noGrp="1" noRot="1" noChangeAspect="1"/>
+          </p:cNvSpPr>
+          <p:nvPr>
+            <p:ph type="sldImg"/>
+          </p:nvPr>
+        </p:nvSpPr>
+        <p:spPr/>
+      </p:sp>
+      <p:sp>
+        <p:nvSpPr>
+          <p:cNvPr id="3" name="Marcador de notas 2"/>
+          <p:cNvSpPr>
+            <a:spLocks noGrp="1"/>
+          </p:cNvSpPr>
+          <p:nvPr>
+            <p:ph type="body" idx="1"/>
+          </p:nvPr>
+        </p:nvSpPr>
+        <p:spPr/>
+        <p:txBody>
+          <a:bodyPr/>
+          <a:lstStyle/>
+          <a:p>
             <a:pPr marL="0" marR="0" lvl="0" indent="0" algn="l" defTabSz="914400" rtl="0" eaLnBrk="1" fontAlgn="auto" latinLnBrk="0" hangingPunct="1">
               <a:lnSpc>
                 <a:spcPct val="100000"/>
@@ -3190,7 +3423,7 @@
           <a:p>
             <a:fld id="{DB7D0A05-FF74-4049-BC13-A9ACD9D2AB82}" type="slidenum">
               <a:rPr lang="es-ES" smtClean="0"/>
-              <a:t>24</a:t>
+              <a:t>26</a:t>
             </a:fld>
             <a:endParaRPr lang="es-ES"/>
           </a:p>
@@ -3209,7 +3442,7 @@
 </p:notes>
 </file>
 
-<file path=ppt/notesSlides/notesSlide25.xml><?xml version="1.0" encoding="utf-8"?>
+<file path=ppt/notesSlides/notesSlide27.xml><?xml version="1.0" encoding="utf-8"?>
 <p:notes xmlns:a="http://schemas.openxmlformats.org/drawingml/2006/main" xmlns:r="http://schemas.openxmlformats.org/officeDocument/2006/relationships" xmlns:p="http://schemas.openxmlformats.org/presentationml/2006/main">
   <p:cSld>
     <p:spTree>
@@ -3445,7 +3678,7 @@
           <a:p>
             <a:fld id="{DB7D0A05-FF74-4049-BC13-A9ACD9D2AB82}" type="slidenum">
               <a:rPr lang="es-ES" smtClean="0"/>
-              <a:t>25</a:t>
+              <a:t>27</a:t>
             </a:fld>
             <a:endParaRPr lang="es-ES"/>
           </a:p>
@@ -3464,7 +3697,7 @@
 </p:notes>
 </file>
 
-<file path=ppt/notesSlides/notesSlide26.xml><?xml version="1.0" encoding="utf-8"?>
+<file path=ppt/notesSlides/notesSlide28.xml><?xml version="1.0" encoding="utf-8"?>
 <p:notes xmlns:a="http://schemas.openxmlformats.org/drawingml/2006/main" xmlns:r="http://schemas.openxmlformats.org/officeDocument/2006/relationships" xmlns:p="http://schemas.openxmlformats.org/presentationml/2006/main">
   <p:cSld>
     <p:spTree>
@@ -3637,7 +3870,7 @@
           <a:p>
             <a:fld id="{DB7D0A05-FF74-4049-BC13-A9ACD9D2AB82}" type="slidenum">
               <a:rPr lang="es-ES" smtClean="0"/>
-              <a:t>26</a:t>
+              <a:t>28</a:t>
             </a:fld>
             <a:endParaRPr lang="es-ES"/>
           </a:p>
@@ -3656,7 +3889,7 @@
 </p:notes>
 </file>
 
-<file path=ppt/notesSlides/notesSlide27.xml><?xml version="1.0" encoding="utf-8"?>
+<file path=ppt/notesSlides/notesSlide29.xml><?xml version="1.0" encoding="utf-8"?>
 <p:notes xmlns:a="http://schemas.openxmlformats.org/drawingml/2006/main" xmlns:r="http://schemas.openxmlformats.org/officeDocument/2006/relationships" xmlns:p="http://schemas.openxmlformats.org/presentationml/2006/main">
   <p:cSld>
     <p:spTree>
@@ -4081,7 +4314,7 @@
           <a:p>
             <a:fld id="{DB7D0A05-FF74-4049-BC13-A9ACD9D2AB82}" type="slidenum">
               <a:rPr lang="es-ES" smtClean="0"/>
-              <a:t>27</a:t>
+              <a:t>29</a:t>
             </a:fld>
             <a:endParaRPr lang="es-ES"/>
           </a:p>
@@ -4091,357 +4324,6 @@
     <p:extLst>
       <p:ext uri="{BB962C8B-B14F-4D97-AF65-F5344CB8AC3E}">
         <p14:creationId xmlns:p14="http://schemas.microsoft.com/office/powerpoint/2010/main" val="4061869060"/>
-      </p:ext>
-    </p:extLst>
-  </p:cSld>
-  <p:clrMapOvr>
-    <a:masterClrMapping/>
-  </p:clrMapOvr>
-</p:notes>
-</file>
-
-<file path=ppt/notesSlides/notesSlide28.xml><?xml version="1.0" encoding="utf-8"?>
-<p:notes xmlns:a="http://schemas.openxmlformats.org/drawingml/2006/main" xmlns:r="http://schemas.openxmlformats.org/officeDocument/2006/relationships" xmlns:p="http://schemas.openxmlformats.org/presentationml/2006/main">
-  <p:cSld>
-    <p:spTree>
-      <p:nvGrpSpPr>
-        <p:cNvPr id="1" name=""/>
-        <p:cNvGrpSpPr/>
-        <p:nvPr/>
-      </p:nvGrpSpPr>
-      <p:grpSpPr>
-        <a:xfrm>
-          <a:off x="0" y="0"/>
-          <a:ext cx="0" cy="0"/>
-          <a:chOff x="0" y="0"/>
-          <a:chExt cx="0" cy="0"/>
-        </a:xfrm>
-      </p:grpSpPr>
-      <p:sp>
-        <p:nvSpPr>
-          <p:cNvPr id="2" name="Marcador de imagen de diapositiva 1"/>
-          <p:cNvSpPr>
-            <a:spLocks noGrp="1" noRot="1" noChangeAspect="1"/>
-          </p:cNvSpPr>
-          <p:nvPr>
-            <p:ph type="sldImg"/>
-          </p:nvPr>
-        </p:nvSpPr>
-        <p:spPr/>
-      </p:sp>
-      <p:sp>
-        <p:nvSpPr>
-          <p:cNvPr id="3" name="Marcador de notas 2"/>
-          <p:cNvSpPr>
-            <a:spLocks noGrp="1"/>
-          </p:cNvSpPr>
-          <p:nvPr>
-            <p:ph type="body" idx="1"/>
-          </p:nvPr>
-        </p:nvSpPr>
-        <p:spPr/>
-        <p:txBody>
-          <a:bodyPr/>
-          <a:lstStyle/>
-          <a:p>
-            <a:pPr marL="0" marR="0" lvl="0" indent="0" algn="l" defTabSz="914400" rtl="0" eaLnBrk="1" fontAlgn="auto" latinLnBrk="0" hangingPunct="1">
-              <a:lnSpc>
-                <a:spcPct val="100000"/>
-              </a:lnSpc>
-              <a:spcBef>
-                <a:spcPts val="0"/>
-              </a:spcBef>
-              <a:spcAft>
-                <a:spcPts val="0"/>
-              </a:spcAft>
-              <a:buClrTx/>
-              <a:buSzTx/>
-              <a:buFontTx/>
-              <a:buNone/>
-              <a:tabLst/>
-              <a:defRPr/>
-            </a:pPr>
-            <a:r>
-              <a:rPr lang="es-ES_tradnl" sz="1200" kern="1200" dirty="0" smtClean="0">
-                <a:solidFill>
-                  <a:schemeClr val="tx1"/>
-                </a:solidFill>
-                <a:effectLst/>
-                <a:latin typeface="+mn-lt"/>
-                <a:ea typeface="+mn-ea"/>
-                <a:cs typeface="+mn-cs"/>
-              </a:rPr>
-              <a:t>Puedes trabajar con GITHUB mediante la consola de GIT y tener acceso a todas los comandos o para familiarizarte y aprender las funciones más básicas (como es nuestro caso ya que no tenemos que hacer uso de comandos avanzados) usar el cliente de escritorio, que es tremendamente sencillo y fácil de usar.</a:t>
-            </a:r>
-          </a:p>
-          <a:p>
-            <a:pPr marL="0" marR="0" lvl="0" indent="0" algn="l" defTabSz="914400" rtl="0" eaLnBrk="1" fontAlgn="auto" latinLnBrk="0" hangingPunct="1">
-              <a:lnSpc>
-                <a:spcPct val="100000"/>
-              </a:lnSpc>
-              <a:spcBef>
-                <a:spcPts val="0"/>
-              </a:spcBef>
-              <a:spcAft>
-                <a:spcPts val="0"/>
-              </a:spcAft>
-              <a:buClrTx/>
-              <a:buSzTx/>
-              <a:buFontTx/>
-              <a:buNone/>
-              <a:tabLst/>
-              <a:defRPr/>
-            </a:pPr>
-            <a:endParaRPr lang="es-ES_tradnl" sz="1200" kern="1200" dirty="0" smtClean="0">
-              <a:solidFill>
-                <a:schemeClr val="tx1"/>
-              </a:solidFill>
-              <a:effectLst/>
-              <a:latin typeface="+mn-lt"/>
-              <a:ea typeface="+mn-ea"/>
-              <a:cs typeface="+mn-cs"/>
-            </a:endParaRPr>
-          </a:p>
-          <a:p>
-            <a:pPr marL="0" marR="0" lvl="0" indent="0" algn="l" defTabSz="914400" rtl="0" eaLnBrk="1" fontAlgn="auto" latinLnBrk="0" hangingPunct="1">
-              <a:lnSpc>
-                <a:spcPct val="100000"/>
-              </a:lnSpc>
-              <a:spcBef>
-                <a:spcPts val="0"/>
-              </a:spcBef>
-              <a:spcAft>
-                <a:spcPts val="0"/>
-              </a:spcAft>
-              <a:buClrTx/>
-              <a:buSzTx/>
-              <a:buFontTx/>
-              <a:buNone/>
-              <a:tabLst/>
-              <a:defRPr/>
-            </a:pPr>
-            <a:r>
-              <a:rPr lang="es-ES_tradnl" sz="1200" kern="1200" dirty="0" smtClean="0">
-                <a:solidFill>
-                  <a:schemeClr val="tx1"/>
-                </a:solidFill>
-                <a:effectLst/>
-                <a:latin typeface="+mn-lt"/>
-                <a:ea typeface="+mn-ea"/>
-                <a:cs typeface="+mn-cs"/>
-              </a:rPr>
-              <a:t>A simple vista podemos ver cómo podemos elegir las ramas, descargarnos la última versión del código, hacer </a:t>
-            </a:r>
-            <a:r>
-              <a:rPr lang="es-ES_tradnl" sz="1200" kern="1200" dirty="0" err="1" smtClean="0">
-                <a:solidFill>
-                  <a:schemeClr val="tx1"/>
-                </a:solidFill>
-                <a:effectLst/>
-                <a:latin typeface="+mn-lt"/>
-                <a:ea typeface="+mn-ea"/>
-                <a:cs typeface="+mn-cs"/>
-              </a:rPr>
-              <a:t>commit</a:t>
-            </a:r>
-            <a:r>
-              <a:rPr lang="es-ES_tradnl" sz="1200" kern="1200" dirty="0" smtClean="0">
-                <a:solidFill>
-                  <a:schemeClr val="tx1"/>
-                </a:solidFill>
-                <a:effectLst/>
-                <a:latin typeface="+mn-lt"/>
-                <a:ea typeface="+mn-ea"/>
-                <a:cs typeface="+mn-cs"/>
-              </a:rPr>
-              <a:t> de los cambios, hacer </a:t>
-            </a:r>
-            <a:r>
-              <a:rPr lang="es-ES_tradnl" sz="1200" kern="1200" dirty="0" err="1" smtClean="0">
-                <a:solidFill>
-                  <a:schemeClr val="tx1"/>
-                </a:solidFill>
-                <a:effectLst/>
-                <a:latin typeface="+mn-lt"/>
-                <a:ea typeface="+mn-ea"/>
-                <a:cs typeface="+mn-cs"/>
-              </a:rPr>
-              <a:t>merge</a:t>
-            </a:r>
-            <a:r>
-              <a:rPr lang="es-ES_tradnl" sz="1200" kern="1200" dirty="0" smtClean="0">
-                <a:solidFill>
-                  <a:schemeClr val="tx1"/>
-                </a:solidFill>
-                <a:effectLst/>
-                <a:latin typeface="+mn-lt"/>
-                <a:ea typeface="+mn-ea"/>
-                <a:cs typeface="+mn-cs"/>
-              </a:rPr>
-              <a:t> de ramas, subir los cambios al repositorio remoto…etc.</a:t>
-            </a:r>
-            <a:endParaRPr lang="es-ES" sz="1200" kern="1200" dirty="0" smtClean="0">
-              <a:solidFill>
-                <a:schemeClr val="tx1"/>
-              </a:solidFill>
-              <a:effectLst/>
-              <a:latin typeface="+mn-lt"/>
-              <a:ea typeface="+mn-ea"/>
-              <a:cs typeface="+mn-cs"/>
-            </a:endParaRPr>
-          </a:p>
-          <a:p>
-            <a:pPr marL="0" marR="0" lvl="0" indent="0" algn="l" defTabSz="914400" rtl="0" eaLnBrk="1" fontAlgn="auto" latinLnBrk="0" hangingPunct="1">
-              <a:lnSpc>
-                <a:spcPct val="100000"/>
-              </a:lnSpc>
-              <a:spcBef>
-                <a:spcPts val="0"/>
-              </a:spcBef>
-              <a:spcAft>
-                <a:spcPts val="0"/>
-              </a:spcAft>
-              <a:buClrTx/>
-              <a:buSzTx/>
-              <a:buFontTx/>
-              <a:buNone/>
-              <a:tabLst/>
-              <a:defRPr/>
-            </a:pPr>
-            <a:endParaRPr lang="es-ES" sz="1200" kern="1200" dirty="0" smtClean="0">
-              <a:solidFill>
-                <a:schemeClr val="tx1"/>
-              </a:solidFill>
-              <a:effectLst/>
-              <a:latin typeface="+mn-lt"/>
-              <a:ea typeface="+mn-ea"/>
-              <a:cs typeface="+mn-cs"/>
-            </a:endParaRPr>
-          </a:p>
-          <a:p>
-            <a:endParaRPr lang="es-ES" dirty="0"/>
-          </a:p>
-        </p:txBody>
-      </p:sp>
-      <p:sp>
-        <p:nvSpPr>
-          <p:cNvPr id="4" name="Marcador de número de diapositiva 3"/>
-          <p:cNvSpPr>
-            <a:spLocks noGrp="1"/>
-          </p:cNvSpPr>
-          <p:nvPr>
-            <p:ph type="sldNum" sz="quarter" idx="10"/>
-          </p:nvPr>
-        </p:nvSpPr>
-        <p:spPr/>
-        <p:txBody>
-          <a:bodyPr/>
-          <a:lstStyle/>
-          <a:p>
-            <a:fld id="{DB7D0A05-FF74-4049-BC13-A9ACD9D2AB82}" type="slidenum">
-              <a:rPr lang="es-ES" smtClean="0"/>
-              <a:t>28</a:t>
-            </a:fld>
-            <a:endParaRPr lang="es-ES"/>
-          </a:p>
-        </p:txBody>
-      </p:sp>
-    </p:spTree>
-    <p:extLst>
-      <p:ext uri="{BB962C8B-B14F-4D97-AF65-F5344CB8AC3E}">
-        <p14:creationId xmlns:p14="http://schemas.microsoft.com/office/powerpoint/2010/main" val="3972647194"/>
-      </p:ext>
-    </p:extLst>
-  </p:cSld>
-  <p:clrMapOvr>
-    <a:masterClrMapping/>
-  </p:clrMapOvr>
-</p:notes>
-</file>
-
-<file path=ppt/notesSlides/notesSlide29.xml><?xml version="1.0" encoding="utf-8"?>
-<p:notes xmlns:a="http://schemas.openxmlformats.org/drawingml/2006/main" xmlns:r="http://schemas.openxmlformats.org/officeDocument/2006/relationships" xmlns:p="http://schemas.openxmlformats.org/presentationml/2006/main">
-  <p:cSld>
-    <p:spTree>
-      <p:nvGrpSpPr>
-        <p:cNvPr id="1" name=""/>
-        <p:cNvGrpSpPr/>
-        <p:nvPr/>
-      </p:nvGrpSpPr>
-      <p:grpSpPr>
-        <a:xfrm>
-          <a:off x="0" y="0"/>
-          <a:ext cx="0" cy="0"/>
-          <a:chOff x="0" y="0"/>
-          <a:chExt cx="0" cy="0"/>
-        </a:xfrm>
-      </p:grpSpPr>
-      <p:sp>
-        <p:nvSpPr>
-          <p:cNvPr id="2" name="Marcador de imagen de diapositiva 1"/>
-          <p:cNvSpPr>
-            <a:spLocks noGrp="1" noRot="1" noChangeAspect="1"/>
-          </p:cNvSpPr>
-          <p:nvPr>
-            <p:ph type="sldImg"/>
-          </p:nvPr>
-        </p:nvSpPr>
-        <p:spPr/>
-      </p:sp>
-      <p:sp>
-        <p:nvSpPr>
-          <p:cNvPr id="3" name="Marcador de notas 2"/>
-          <p:cNvSpPr>
-            <a:spLocks noGrp="1"/>
-          </p:cNvSpPr>
-          <p:nvPr>
-            <p:ph type="body" idx="1"/>
-          </p:nvPr>
-        </p:nvSpPr>
-        <p:spPr/>
-        <p:txBody>
-          <a:bodyPr/>
-          <a:lstStyle/>
-          <a:p>
-            <a:r>
-              <a:rPr lang="es-ES" dirty="0" smtClean="0"/>
-              <a:t>Y bueno, ya para finalizar pues así es como nos imaginábamos nuestra aplicación</a:t>
-            </a:r>
-            <a:r>
-              <a:rPr lang="es-ES" baseline="0" dirty="0" smtClean="0"/>
-              <a:t> web.</a:t>
-            </a:r>
-            <a:endParaRPr lang="es-ES" dirty="0"/>
-          </a:p>
-        </p:txBody>
-      </p:sp>
-      <p:sp>
-        <p:nvSpPr>
-          <p:cNvPr id="4" name="Marcador de número de diapositiva 3"/>
-          <p:cNvSpPr>
-            <a:spLocks noGrp="1"/>
-          </p:cNvSpPr>
-          <p:nvPr>
-            <p:ph type="sldNum" sz="quarter" idx="10"/>
-          </p:nvPr>
-        </p:nvSpPr>
-        <p:spPr/>
-        <p:txBody>
-          <a:bodyPr/>
-          <a:lstStyle/>
-          <a:p>
-            <a:fld id="{DB7D0A05-FF74-4049-BC13-A9ACD9D2AB82}" type="slidenum">
-              <a:rPr lang="es-ES" smtClean="0"/>
-              <a:t>29</a:t>
-            </a:fld>
-            <a:endParaRPr lang="es-ES"/>
-          </a:p>
-        </p:txBody>
-      </p:sp>
-    </p:spTree>
-    <p:extLst>
-      <p:ext uri="{BB962C8B-B14F-4D97-AF65-F5344CB8AC3E}">
-        <p14:creationId xmlns:p14="http://schemas.microsoft.com/office/powerpoint/2010/main" val="3540851105"/>
       </p:ext>
     </p:extLst>
   </p:cSld>
@@ -4659,18 +4541,181 @@
           <a:bodyPr/>
           <a:lstStyle/>
           <a:p>
-            <a:r>
-              <a:rPr lang="es-ES" dirty="0" smtClean="0"/>
-              <a:t>Y </a:t>
-            </a:r>
-            <a:r>
-              <a:rPr lang="es-ES" dirty="0" err="1" smtClean="0"/>
-              <a:t>asi</a:t>
-            </a:r>
-            <a:r>
-              <a:rPr lang="es-ES" dirty="0" smtClean="0"/>
-              <a:t> es como la hemos conseguido.</a:t>
-            </a:r>
+            <a:pPr marL="0" marR="0" lvl="0" indent="0" algn="l" defTabSz="914400" rtl="0" eaLnBrk="1" fontAlgn="auto" latinLnBrk="0" hangingPunct="1">
+              <a:lnSpc>
+                <a:spcPct val="100000"/>
+              </a:lnSpc>
+              <a:spcBef>
+                <a:spcPts val="0"/>
+              </a:spcBef>
+              <a:spcAft>
+                <a:spcPts val="0"/>
+              </a:spcAft>
+              <a:buClrTx/>
+              <a:buSzTx/>
+              <a:buFontTx/>
+              <a:buNone/>
+              <a:tabLst/>
+              <a:defRPr/>
+            </a:pPr>
+            <a:r>
+              <a:rPr lang="es-ES_tradnl" sz="1200" kern="1200" dirty="0" smtClean="0">
+                <a:solidFill>
+                  <a:schemeClr val="tx1"/>
+                </a:solidFill>
+                <a:effectLst/>
+                <a:latin typeface="+mn-lt"/>
+                <a:ea typeface="+mn-ea"/>
+                <a:cs typeface="+mn-cs"/>
+              </a:rPr>
+              <a:t>Puedes trabajar con GITHUB mediante la consola de GIT y tener acceso a todas los comandos o para familiarizarte y aprender las funciones más básicas (como es nuestro caso ya que no tenemos que hacer uso de comandos avanzados) usar el cliente de escritorio, que es tremendamente sencillo y fácil de usar.</a:t>
+            </a:r>
+          </a:p>
+          <a:p>
+            <a:pPr marL="0" marR="0" lvl="0" indent="0" algn="l" defTabSz="914400" rtl="0" eaLnBrk="1" fontAlgn="auto" latinLnBrk="0" hangingPunct="1">
+              <a:lnSpc>
+                <a:spcPct val="100000"/>
+              </a:lnSpc>
+              <a:spcBef>
+                <a:spcPts val="0"/>
+              </a:spcBef>
+              <a:spcAft>
+                <a:spcPts val="0"/>
+              </a:spcAft>
+              <a:buClrTx/>
+              <a:buSzTx/>
+              <a:buFontTx/>
+              <a:buNone/>
+              <a:tabLst/>
+              <a:defRPr/>
+            </a:pPr>
+            <a:endParaRPr lang="es-ES_tradnl" sz="1200" kern="1200" dirty="0" smtClean="0">
+              <a:solidFill>
+                <a:schemeClr val="tx1"/>
+              </a:solidFill>
+              <a:effectLst/>
+              <a:latin typeface="+mn-lt"/>
+              <a:ea typeface="+mn-ea"/>
+              <a:cs typeface="+mn-cs"/>
+            </a:endParaRPr>
+          </a:p>
+          <a:p>
+            <a:pPr marL="0" marR="0" lvl="0" indent="0" algn="l" defTabSz="914400" rtl="0" eaLnBrk="1" fontAlgn="auto" latinLnBrk="0" hangingPunct="1">
+              <a:lnSpc>
+                <a:spcPct val="100000"/>
+              </a:lnSpc>
+              <a:spcBef>
+                <a:spcPts val="0"/>
+              </a:spcBef>
+              <a:spcAft>
+                <a:spcPts val="0"/>
+              </a:spcAft>
+              <a:buClrTx/>
+              <a:buSzTx/>
+              <a:buFontTx/>
+              <a:buNone/>
+              <a:tabLst/>
+              <a:defRPr/>
+            </a:pPr>
+            <a:r>
+              <a:rPr lang="es-ES_tradnl" sz="1200" kern="1200" dirty="0" smtClean="0">
+                <a:solidFill>
+                  <a:schemeClr val="tx1"/>
+                </a:solidFill>
+                <a:effectLst/>
+                <a:latin typeface="+mn-lt"/>
+                <a:ea typeface="+mn-ea"/>
+                <a:cs typeface="+mn-cs"/>
+              </a:rPr>
+              <a:t>A simple vista podemos ver cómo podemos elegir las ramas, descargarnos la última versión del código, hacer </a:t>
+            </a:r>
+            <a:r>
+              <a:rPr lang="es-ES_tradnl" sz="1200" kern="1200" dirty="0" err="1" smtClean="0">
+                <a:solidFill>
+                  <a:schemeClr val="tx1"/>
+                </a:solidFill>
+                <a:effectLst/>
+                <a:latin typeface="+mn-lt"/>
+                <a:ea typeface="+mn-ea"/>
+                <a:cs typeface="+mn-cs"/>
+              </a:rPr>
+              <a:t>commit</a:t>
+            </a:r>
+            <a:r>
+              <a:rPr lang="es-ES_tradnl" sz="1200" kern="1200" dirty="0" smtClean="0">
+                <a:solidFill>
+                  <a:schemeClr val="tx1"/>
+                </a:solidFill>
+                <a:effectLst/>
+                <a:latin typeface="+mn-lt"/>
+                <a:ea typeface="+mn-ea"/>
+                <a:cs typeface="+mn-cs"/>
+              </a:rPr>
+              <a:t> de los cambios, hacer </a:t>
+            </a:r>
+            <a:r>
+              <a:rPr lang="es-ES_tradnl" sz="1200" kern="1200" dirty="0" err="1" smtClean="0">
+                <a:solidFill>
+                  <a:schemeClr val="tx1"/>
+                </a:solidFill>
+                <a:effectLst/>
+                <a:latin typeface="+mn-lt"/>
+                <a:ea typeface="+mn-ea"/>
+                <a:cs typeface="+mn-cs"/>
+              </a:rPr>
+              <a:t>merge</a:t>
+            </a:r>
+            <a:r>
+              <a:rPr lang="es-ES_tradnl" sz="1200" kern="1200" dirty="0" smtClean="0">
+                <a:solidFill>
+                  <a:schemeClr val="tx1"/>
+                </a:solidFill>
+                <a:effectLst/>
+                <a:latin typeface="+mn-lt"/>
+                <a:ea typeface="+mn-ea"/>
+                <a:cs typeface="+mn-cs"/>
+              </a:rPr>
+              <a:t> de ramas, subir los cambios al repositorio remoto…etc.</a:t>
+            </a:r>
+            <a:endParaRPr lang="es-ES" sz="1200" kern="1200" dirty="0" smtClean="0">
+              <a:solidFill>
+                <a:schemeClr val="tx1"/>
+              </a:solidFill>
+              <a:effectLst/>
+              <a:latin typeface="+mn-lt"/>
+              <a:ea typeface="+mn-ea"/>
+              <a:cs typeface="+mn-cs"/>
+            </a:endParaRPr>
+          </a:p>
+          <a:p>
+            <a:pPr marL="0" marR="0" lvl="0" indent="0" algn="l" defTabSz="914400" rtl="0" eaLnBrk="1" fontAlgn="auto" latinLnBrk="0" hangingPunct="1">
+              <a:lnSpc>
+                <a:spcPct val="100000"/>
+              </a:lnSpc>
+              <a:spcBef>
+                <a:spcPts val="0"/>
+              </a:spcBef>
+              <a:spcAft>
+                <a:spcPts val="0"/>
+              </a:spcAft>
+              <a:buClrTx/>
+              <a:buSzTx/>
+              <a:buFontTx/>
+              <a:buNone/>
+              <a:tabLst/>
+              <a:defRPr/>
+            </a:pPr>
+            <a:endParaRPr lang="es-ES" sz="1200" kern="1200" dirty="0" smtClean="0">
+              <a:solidFill>
+                <a:schemeClr val="tx1"/>
+              </a:solidFill>
+              <a:effectLst/>
+              <a:latin typeface="+mn-lt"/>
+              <a:ea typeface="+mn-ea"/>
+              <a:cs typeface="+mn-cs"/>
+            </a:endParaRPr>
+          </a:p>
+          <a:p>
             <a:endParaRPr lang="es-ES" dirty="0"/>
           </a:p>
         </p:txBody>
@@ -4701,7 +4746,7 @@
     </p:spTree>
     <p:extLst>
       <p:ext uri="{BB962C8B-B14F-4D97-AF65-F5344CB8AC3E}">
-        <p14:creationId xmlns:p14="http://schemas.microsoft.com/office/powerpoint/2010/main" val="124897716"/>
+        <p14:creationId xmlns:p14="http://schemas.microsoft.com/office/powerpoint/2010/main" val="3972647194"/>
       </p:ext>
     </p:extLst>
   </p:cSld>
@@ -4757,11 +4802,11 @@
           <a:p>
             <a:r>
               <a:rPr lang="es-ES" dirty="0" smtClean="0"/>
-              <a:t>Muchas gracias a todos y a continuación</a:t>
+              <a:t>Y bueno, ya para finalizar pues así es como nos imaginábamos nuestra aplicación</a:t>
             </a:r>
             <a:r>
               <a:rPr lang="es-ES" baseline="0" dirty="0" smtClean="0"/>
-              <a:t> vamos a ver la web en funcionamiento con una pequeña demo.</a:t>
+              <a:t> web.</a:t>
             </a:r>
             <a:endParaRPr lang="es-ES" dirty="0"/>
           </a:p>
@@ -4785,6 +4830,194 @@
             <a:fld id="{DB7D0A05-FF74-4049-BC13-A9ACD9D2AB82}" type="slidenum">
               <a:rPr lang="es-ES" smtClean="0"/>
               <a:t>31</a:t>
+            </a:fld>
+            <a:endParaRPr lang="es-ES"/>
+          </a:p>
+        </p:txBody>
+      </p:sp>
+    </p:spTree>
+    <p:extLst>
+      <p:ext uri="{BB962C8B-B14F-4D97-AF65-F5344CB8AC3E}">
+        <p14:creationId xmlns:p14="http://schemas.microsoft.com/office/powerpoint/2010/main" val="3540851105"/>
+      </p:ext>
+    </p:extLst>
+  </p:cSld>
+  <p:clrMapOvr>
+    <a:masterClrMapping/>
+  </p:clrMapOvr>
+</p:notes>
+</file>
+
+<file path=ppt/notesSlides/notesSlide32.xml><?xml version="1.0" encoding="utf-8"?>
+<p:notes xmlns:a="http://schemas.openxmlformats.org/drawingml/2006/main" xmlns:r="http://schemas.openxmlformats.org/officeDocument/2006/relationships" xmlns:p="http://schemas.openxmlformats.org/presentationml/2006/main">
+  <p:cSld>
+    <p:spTree>
+      <p:nvGrpSpPr>
+        <p:cNvPr id="1" name=""/>
+        <p:cNvGrpSpPr/>
+        <p:nvPr/>
+      </p:nvGrpSpPr>
+      <p:grpSpPr>
+        <a:xfrm>
+          <a:off x="0" y="0"/>
+          <a:ext cx="0" cy="0"/>
+          <a:chOff x="0" y="0"/>
+          <a:chExt cx="0" cy="0"/>
+        </a:xfrm>
+      </p:grpSpPr>
+      <p:sp>
+        <p:nvSpPr>
+          <p:cNvPr id="2" name="Marcador de imagen de diapositiva 1"/>
+          <p:cNvSpPr>
+            <a:spLocks noGrp="1" noRot="1" noChangeAspect="1"/>
+          </p:cNvSpPr>
+          <p:nvPr>
+            <p:ph type="sldImg"/>
+          </p:nvPr>
+        </p:nvSpPr>
+        <p:spPr/>
+      </p:sp>
+      <p:sp>
+        <p:nvSpPr>
+          <p:cNvPr id="3" name="Marcador de notas 2"/>
+          <p:cNvSpPr>
+            <a:spLocks noGrp="1"/>
+          </p:cNvSpPr>
+          <p:nvPr>
+            <p:ph type="body" idx="1"/>
+          </p:nvPr>
+        </p:nvSpPr>
+        <p:spPr/>
+        <p:txBody>
+          <a:bodyPr/>
+          <a:lstStyle/>
+          <a:p>
+            <a:r>
+              <a:rPr lang="es-ES" dirty="0" smtClean="0"/>
+              <a:t>Y </a:t>
+            </a:r>
+            <a:r>
+              <a:rPr lang="es-ES" dirty="0" err="1" smtClean="0"/>
+              <a:t>asi</a:t>
+            </a:r>
+            <a:r>
+              <a:rPr lang="es-ES" dirty="0" smtClean="0"/>
+              <a:t> es como la hemos conseguido.</a:t>
+            </a:r>
+            <a:endParaRPr lang="es-ES" dirty="0"/>
+          </a:p>
+        </p:txBody>
+      </p:sp>
+      <p:sp>
+        <p:nvSpPr>
+          <p:cNvPr id="4" name="Marcador de número de diapositiva 3"/>
+          <p:cNvSpPr>
+            <a:spLocks noGrp="1"/>
+          </p:cNvSpPr>
+          <p:nvPr>
+            <p:ph type="sldNum" sz="quarter" idx="10"/>
+          </p:nvPr>
+        </p:nvSpPr>
+        <p:spPr/>
+        <p:txBody>
+          <a:bodyPr/>
+          <a:lstStyle/>
+          <a:p>
+            <a:fld id="{DB7D0A05-FF74-4049-BC13-A9ACD9D2AB82}" type="slidenum">
+              <a:rPr lang="es-ES" smtClean="0"/>
+              <a:t>32</a:t>
+            </a:fld>
+            <a:endParaRPr lang="es-ES"/>
+          </a:p>
+        </p:txBody>
+      </p:sp>
+    </p:spTree>
+    <p:extLst>
+      <p:ext uri="{BB962C8B-B14F-4D97-AF65-F5344CB8AC3E}">
+        <p14:creationId xmlns:p14="http://schemas.microsoft.com/office/powerpoint/2010/main" val="124897716"/>
+      </p:ext>
+    </p:extLst>
+  </p:cSld>
+  <p:clrMapOvr>
+    <a:masterClrMapping/>
+  </p:clrMapOvr>
+</p:notes>
+</file>
+
+<file path=ppt/notesSlides/notesSlide33.xml><?xml version="1.0" encoding="utf-8"?>
+<p:notes xmlns:a="http://schemas.openxmlformats.org/drawingml/2006/main" xmlns:r="http://schemas.openxmlformats.org/officeDocument/2006/relationships" xmlns:p="http://schemas.openxmlformats.org/presentationml/2006/main">
+  <p:cSld>
+    <p:spTree>
+      <p:nvGrpSpPr>
+        <p:cNvPr id="1" name=""/>
+        <p:cNvGrpSpPr/>
+        <p:nvPr/>
+      </p:nvGrpSpPr>
+      <p:grpSpPr>
+        <a:xfrm>
+          <a:off x="0" y="0"/>
+          <a:ext cx="0" cy="0"/>
+          <a:chOff x="0" y="0"/>
+          <a:chExt cx="0" cy="0"/>
+        </a:xfrm>
+      </p:grpSpPr>
+      <p:sp>
+        <p:nvSpPr>
+          <p:cNvPr id="2" name="Marcador de imagen de diapositiva 1"/>
+          <p:cNvSpPr>
+            <a:spLocks noGrp="1" noRot="1" noChangeAspect="1"/>
+          </p:cNvSpPr>
+          <p:nvPr>
+            <p:ph type="sldImg"/>
+          </p:nvPr>
+        </p:nvSpPr>
+        <p:spPr/>
+      </p:sp>
+      <p:sp>
+        <p:nvSpPr>
+          <p:cNvPr id="3" name="Marcador de notas 2"/>
+          <p:cNvSpPr>
+            <a:spLocks noGrp="1"/>
+          </p:cNvSpPr>
+          <p:nvPr>
+            <p:ph type="body" idx="1"/>
+          </p:nvPr>
+        </p:nvSpPr>
+        <p:spPr/>
+        <p:txBody>
+          <a:bodyPr/>
+          <a:lstStyle/>
+          <a:p>
+            <a:r>
+              <a:rPr lang="es-ES" dirty="0" smtClean="0"/>
+              <a:t>Muchas gracias a todos y a continuación</a:t>
+            </a:r>
+            <a:r>
+              <a:rPr lang="es-ES" baseline="0" dirty="0" smtClean="0"/>
+              <a:t> vamos a ver la web en funcionamiento con una pequeña demo.</a:t>
+            </a:r>
+            <a:endParaRPr lang="es-ES" dirty="0"/>
+          </a:p>
+        </p:txBody>
+      </p:sp>
+      <p:sp>
+        <p:nvSpPr>
+          <p:cNvPr id="4" name="Marcador de número de diapositiva 3"/>
+          <p:cNvSpPr>
+            <a:spLocks noGrp="1"/>
+          </p:cNvSpPr>
+          <p:nvPr>
+            <p:ph type="sldNum" sz="quarter" idx="10"/>
+          </p:nvPr>
+        </p:nvSpPr>
+        <p:spPr/>
+        <p:txBody>
+          <a:bodyPr/>
+          <a:lstStyle/>
+          <a:p>
+            <a:fld id="{DB7D0A05-FF74-4049-BC13-A9ACD9D2AB82}" type="slidenum">
+              <a:rPr lang="es-ES" smtClean="0"/>
+              <a:t>33</a:t>
             </a:fld>
             <a:endParaRPr lang="es-ES"/>
           </a:p>
@@ -6255,7 +6488,7 @@
           <a:p>
             <a:fld id="{A3A6FC1A-A205-4A12-B450-C96D11F5D5F8}" type="datetimeFigureOut">
               <a:rPr lang="es-ES" smtClean="0"/>
-              <a:t>26/05/2018</a:t>
+              <a:t>03/06/2018</a:t>
             </a:fld>
             <a:endParaRPr lang="es-ES"/>
           </a:p>
@@ -6425,7 +6658,7 @@
           <a:p>
             <a:fld id="{A3A6FC1A-A205-4A12-B450-C96D11F5D5F8}" type="datetimeFigureOut">
               <a:rPr lang="es-ES" smtClean="0"/>
-              <a:t>26/05/2018</a:t>
+              <a:t>03/06/2018</a:t>
             </a:fld>
             <a:endParaRPr lang="es-ES"/>
           </a:p>
@@ -6605,7 +6838,7 @@
           <a:p>
             <a:fld id="{A3A6FC1A-A205-4A12-B450-C96D11F5D5F8}" type="datetimeFigureOut">
               <a:rPr lang="es-ES" smtClean="0"/>
-              <a:t>26/05/2018</a:t>
+              <a:t>03/06/2018</a:t>
             </a:fld>
             <a:endParaRPr lang="es-ES"/>
           </a:p>
@@ -6775,7 +7008,7 @@
           <a:p>
             <a:fld id="{A3A6FC1A-A205-4A12-B450-C96D11F5D5F8}" type="datetimeFigureOut">
               <a:rPr lang="es-ES" smtClean="0"/>
-              <a:t>26/05/2018</a:t>
+              <a:t>03/06/2018</a:t>
             </a:fld>
             <a:endParaRPr lang="es-ES"/>
           </a:p>
@@ -7021,7 +7254,7 @@
           <a:p>
             <a:fld id="{A3A6FC1A-A205-4A12-B450-C96D11F5D5F8}" type="datetimeFigureOut">
               <a:rPr lang="es-ES" smtClean="0"/>
-              <a:t>26/05/2018</a:t>
+              <a:t>03/06/2018</a:t>
             </a:fld>
             <a:endParaRPr lang="es-ES"/>
           </a:p>
@@ -7253,7 +7486,7 @@
           <a:p>
             <a:fld id="{A3A6FC1A-A205-4A12-B450-C96D11F5D5F8}" type="datetimeFigureOut">
               <a:rPr lang="es-ES" smtClean="0"/>
-              <a:t>26/05/2018</a:t>
+              <a:t>03/06/2018</a:t>
             </a:fld>
             <a:endParaRPr lang="es-ES"/>
           </a:p>
@@ -7620,7 +7853,7 @@
           <a:p>
             <a:fld id="{A3A6FC1A-A205-4A12-B450-C96D11F5D5F8}" type="datetimeFigureOut">
               <a:rPr lang="es-ES" smtClean="0"/>
-              <a:t>26/05/2018</a:t>
+              <a:t>03/06/2018</a:t>
             </a:fld>
             <a:endParaRPr lang="es-ES"/>
           </a:p>
@@ -7738,7 +7971,7 @@
           <a:p>
             <a:fld id="{A3A6FC1A-A205-4A12-B450-C96D11F5D5F8}" type="datetimeFigureOut">
               <a:rPr lang="es-ES" smtClean="0"/>
-              <a:t>26/05/2018</a:t>
+              <a:t>03/06/2018</a:t>
             </a:fld>
             <a:endParaRPr lang="es-ES"/>
           </a:p>
@@ -7833,7 +8066,7 @@
           <a:p>
             <a:fld id="{A3A6FC1A-A205-4A12-B450-C96D11F5D5F8}" type="datetimeFigureOut">
               <a:rPr lang="es-ES" smtClean="0"/>
-              <a:t>26/05/2018</a:t>
+              <a:t>03/06/2018</a:t>
             </a:fld>
             <a:endParaRPr lang="es-ES"/>
           </a:p>
@@ -8110,7 +8343,7 @@
           <a:p>
             <a:fld id="{A3A6FC1A-A205-4A12-B450-C96D11F5D5F8}" type="datetimeFigureOut">
               <a:rPr lang="es-ES" smtClean="0"/>
-              <a:t>26/05/2018</a:t>
+              <a:t>03/06/2018</a:t>
             </a:fld>
             <a:endParaRPr lang="es-ES"/>
           </a:p>
@@ -8363,7 +8596,7 @@
           <a:p>
             <a:fld id="{A3A6FC1A-A205-4A12-B450-C96D11F5D5F8}" type="datetimeFigureOut">
               <a:rPr lang="es-ES" smtClean="0"/>
-              <a:t>26/05/2018</a:t>
+              <a:t>03/06/2018</a:t>
             </a:fld>
             <a:endParaRPr lang="es-ES"/>
           </a:p>
@@ -8576,7 +8809,7 @@
           <a:p>
             <a:fld id="{A3A6FC1A-A205-4A12-B450-C96D11F5D5F8}" type="datetimeFigureOut">
               <a:rPr lang="es-ES" smtClean="0"/>
-              <a:t>26/05/2018</a:t>
+              <a:t>03/06/2018</a:t>
             </a:fld>
             <a:endParaRPr lang="es-ES"/>
           </a:p>
@@ -9559,7 +9792,7 @@
         </p:blipFill>
         <p:spPr>
           <a:xfrm>
-            <a:off x="3574610" y="1116971"/>
+            <a:off x="3531067" y="1073428"/>
             <a:ext cx="4572000" cy="5257800"/>
           </a:xfrm>
           <a:prstGeom prst="rect">
@@ -9588,6 +9821,114 @@
 </file>
 
 <file path=ppt/slides/slide14.xml><?xml version="1.0" encoding="utf-8"?>
+<p:sld xmlns:a="http://schemas.openxmlformats.org/drawingml/2006/main" xmlns:r="http://schemas.openxmlformats.org/officeDocument/2006/relationships" xmlns:p="http://schemas.openxmlformats.org/presentationml/2006/main">
+  <p:cSld>
+    <p:spTree>
+      <p:nvGrpSpPr>
+        <p:cNvPr id="1" name=""/>
+        <p:cNvGrpSpPr/>
+        <p:nvPr/>
+      </p:nvGrpSpPr>
+      <p:grpSpPr>
+        <a:xfrm>
+          <a:off x="0" y="0"/>
+          <a:ext cx="0" cy="0"/>
+          <a:chOff x="0" y="0"/>
+          <a:chExt cx="0" cy="0"/>
+        </a:xfrm>
+      </p:grpSpPr>
+      <p:pic>
+        <p:nvPicPr>
+          <p:cNvPr id="2" name="Imagen 1"/>
+          <p:cNvPicPr>
+            <a:picLocks noChangeAspect="1"/>
+          </p:cNvPicPr>
+          <p:nvPr/>
+        </p:nvPicPr>
+        <p:blipFill>
+          <a:blip r:embed="rId3"/>
+          <a:stretch>
+            <a:fillRect/>
+          </a:stretch>
+        </p:blipFill>
+        <p:spPr>
+          <a:xfrm>
+            <a:off x="3115182" y="370041"/>
+            <a:ext cx="5812509" cy="5889906"/>
+          </a:xfrm>
+          <a:prstGeom prst="rect">
+            <a:avLst/>
+          </a:prstGeom>
+        </p:spPr>
+      </p:pic>
+    </p:spTree>
+    <p:extLst>
+      <p:ext uri="{BB962C8B-B14F-4D97-AF65-F5344CB8AC3E}">
+        <p14:creationId xmlns:p14="http://schemas.microsoft.com/office/powerpoint/2010/main" val="2614894823"/>
+      </p:ext>
+    </p:extLst>
+  </p:cSld>
+  <p:clrMapOvr>
+    <a:masterClrMapping/>
+  </p:clrMapOvr>
+</p:sld>
+</file>
+
+<file path=ppt/slides/slide15.xml><?xml version="1.0" encoding="utf-8"?>
+<p:sld xmlns:a="http://schemas.openxmlformats.org/drawingml/2006/main" xmlns:r="http://schemas.openxmlformats.org/officeDocument/2006/relationships" xmlns:p="http://schemas.openxmlformats.org/presentationml/2006/main">
+  <p:cSld>
+    <p:spTree>
+      <p:nvGrpSpPr>
+        <p:cNvPr id="1" name=""/>
+        <p:cNvGrpSpPr/>
+        <p:nvPr/>
+      </p:nvGrpSpPr>
+      <p:grpSpPr>
+        <a:xfrm>
+          <a:off x="0" y="0"/>
+          <a:ext cx="0" cy="0"/>
+          <a:chOff x="0" y="0"/>
+          <a:chExt cx="0" cy="0"/>
+        </a:xfrm>
+      </p:grpSpPr>
+      <p:pic>
+        <p:nvPicPr>
+          <p:cNvPr id="3" name="Imagen 2"/>
+          <p:cNvPicPr>
+            <a:picLocks noChangeAspect="1"/>
+          </p:cNvPicPr>
+          <p:nvPr/>
+        </p:nvPicPr>
+        <p:blipFill>
+          <a:blip r:embed="rId3"/>
+          <a:stretch>
+            <a:fillRect/>
+          </a:stretch>
+        </p:blipFill>
+        <p:spPr>
+          <a:xfrm>
+            <a:off x="3973894" y="171638"/>
+            <a:ext cx="4196712" cy="6538877"/>
+          </a:xfrm>
+          <a:prstGeom prst="rect">
+            <a:avLst/>
+          </a:prstGeom>
+        </p:spPr>
+      </p:pic>
+    </p:spTree>
+    <p:extLst>
+      <p:ext uri="{BB962C8B-B14F-4D97-AF65-F5344CB8AC3E}">
+        <p14:creationId xmlns:p14="http://schemas.microsoft.com/office/powerpoint/2010/main" val="3355828527"/>
+      </p:ext>
+    </p:extLst>
+  </p:cSld>
+  <p:clrMapOvr>
+    <a:masterClrMapping/>
+  </p:clrMapOvr>
+</p:sld>
+</file>
+
+<file path=ppt/slides/slide16.xml><?xml version="1.0" encoding="utf-8"?>
 <p:sld xmlns:a="http://schemas.openxmlformats.org/drawingml/2006/main" xmlns:r="http://schemas.openxmlformats.org/officeDocument/2006/relationships" xmlns:p="http://schemas.openxmlformats.org/presentationml/2006/main">
   <p:cSld>
     <p:spTree>
@@ -9654,7 +9995,7 @@
 </p:sld>
 </file>
 
-<file path=ppt/slides/slide15.xml><?xml version="1.0" encoding="utf-8"?>
+<file path=ppt/slides/slide17.xml><?xml version="1.0" encoding="utf-8"?>
 <p:sld xmlns:a="http://schemas.openxmlformats.org/drawingml/2006/main" xmlns:r="http://schemas.openxmlformats.org/officeDocument/2006/relationships" xmlns:p="http://schemas.openxmlformats.org/presentationml/2006/main">
   <p:cSld>
     <p:spTree>
@@ -9719,7 +10060,7 @@
 </p:sld>
 </file>
 
-<file path=ppt/slides/slide16.xml><?xml version="1.0" encoding="utf-8"?>
+<file path=ppt/slides/slide18.xml><?xml version="1.0" encoding="utf-8"?>
 <p:sld xmlns:a="http://schemas.openxmlformats.org/drawingml/2006/main" xmlns:r="http://schemas.openxmlformats.org/officeDocument/2006/relationships" xmlns:p="http://schemas.openxmlformats.org/presentationml/2006/main">
   <p:cSld>
     <p:spTree>
@@ -9786,7 +10127,7 @@
 </p:sld>
 </file>
 
-<file path=ppt/slides/slide17.xml><?xml version="1.0" encoding="utf-8"?>
+<file path=ppt/slides/slide19.xml><?xml version="1.0" encoding="utf-8"?>
 <p:sld xmlns:a="http://schemas.openxmlformats.org/drawingml/2006/main" xmlns:r="http://schemas.openxmlformats.org/officeDocument/2006/relationships" xmlns:p="http://schemas.openxmlformats.org/presentationml/2006/main">
   <p:cSld>
     <p:spTree>
@@ -9837,246 +10178,6 @@
     <p:extLst>
       <p:ext uri="{BB962C8B-B14F-4D97-AF65-F5344CB8AC3E}">
         <p14:creationId xmlns:p14="http://schemas.microsoft.com/office/powerpoint/2010/main" val="3911173567"/>
-      </p:ext>
-    </p:extLst>
-  </p:cSld>
-  <p:clrMapOvr>
-    <a:masterClrMapping/>
-  </p:clrMapOvr>
-  <p:timing>
-    <p:tnLst>
-      <p:par>
-        <p:cTn id="1" dur="indefinite" restart="never" nodeType="tmRoot"/>
-      </p:par>
-    </p:tnLst>
-  </p:timing>
-</p:sld>
-</file>
-
-<file path=ppt/slides/slide18.xml><?xml version="1.0" encoding="utf-8"?>
-<p:sld xmlns:a="http://schemas.openxmlformats.org/drawingml/2006/main" xmlns:r="http://schemas.openxmlformats.org/officeDocument/2006/relationships" xmlns:p="http://schemas.openxmlformats.org/presentationml/2006/main">
-  <p:cSld>
-    <p:spTree>
-      <p:nvGrpSpPr>
-        <p:cNvPr id="1" name=""/>
-        <p:cNvGrpSpPr/>
-        <p:nvPr/>
-      </p:nvGrpSpPr>
-      <p:grpSpPr>
-        <a:xfrm>
-          <a:off x="0" y="0"/>
-          <a:ext cx="0" cy="0"/>
-          <a:chOff x="0" y="0"/>
-          <a:chExt cx="0" cy="0"/>
-        </a:xfrm>
-      </p:grpSpPr>
-      <p:pic>
-        <p:nvPicPr>
-          <p:cNvPr id="3" name="Imagen 2"/>
-          <p:cNvPicPr/>
-          <p:nvPr/>
-        </p:nvPicPr>
-        <p:blipFill>
-          <a:blip r:embed="rId3"/>
-          <a:stretch>
-            <a:fillRect/>
-          </a:stretch>
-        </p:blipFill>
-        <p:spPr>
-          <a:xfrm>
-            <a:off x="6088604" y="1516238"/>
-            <a:ext cx="5400040" cy="3192145"/>
-          </a:xfrm>
-          <a:prstGeom prst="rect">
-            <a:avLst/>
-          </a:prstGeom>
-        </p:spPr>
-      </p:pic>
-      <p:sp>
-        <p:nvSpPr>
-          <p:cNvPr id="4" name="Rectángulo 3"/>
-          <p:cNvSpPr/>
-          <p:nvPr/>
-        </p:nvSpPr>
-        <p:spPr>
-          <a:xfrm>
-            <a:off x="7250001" y="648471"/>
-            <a:ext cx="2125454" cy="388696"/>
-          </a:xfrm>
-          <a:prstGeom prst="rect">
-            <a:avLst/>
-          </a:prstGeom>
-        </p:spPr>
-        <p:txBody>
-          <a:bodyPr wrap="none">
-            <a:spAutoFit/>
-          </a:bodyPr>
-          <a:lstStyle/>
-          <a:p>
-            <a:pPr>
-              <a:lnSpc>
-                <a:spcPct val="107000"/>
-              </a:lnSpc>
-              <a:spcAft>
-                <a:spcPts val="800"/>
-              </a:spcAft>
-            </a:pPr>
-            <a:r>
-              <a:rPr lang="es-ES_tradnl" b="1" dirty="0">
-                <a:latin typeface="Calibri" panose="020F0502020204030204" pitchFamily="34" charset="0"/>
-                <a:ea typeface="Calibri" panose="020F0502020204030204" pitchFamily="34" charset="0"/>
-                <a:cs typeface="Times New Roman" panose="02020603050405020304" pitchFamily="18" charset="0"/>
-              </a:rPr>
-              <a:t>USO DE BOOTSTRAP</a:t>
-            </a:r>
-            <a:endParaRPr lang="es-ES" sz="1400" dirty="0">
-              <a:effectLst/>
-              <a:latin typeface="Calibri" panose="020F0502020204030204" pitchFamily="34" charset="0"/>
-              <a:ea typeface="Calibri" panose="020F0502020204030204" pitchFamily="34" charset="0"/>
-              <a:cs typeface="Times New Roman" panose="02020603050405020304" pitchFamily="18" charset="0"/>
-            </a:endParaRPr>
-          </a:p>
-        </p:txBody>
-      </p:sp>
-      <p:pic>
-        <p:nvPicPr>
-          <p:cNvPr id="5" name="Imagen 4"/>
-          <p:cNvPicPr/>
-          <p:nvPr/>
-        </p:nvPicPr>
-        <p:blipFill>
-          <a:blip r:embed="rId4"/>
-          <a:stretch>
-            <a:fillRect/>
-          </a:stretch>
-        </p:blipFill>
-        <p:spPr>
-          <a:xfrm>
-            <a:off x="209435" y="2170923"/>
-            <a:ext cx="5400040" cy="2537460"/>
-          </a:xfrm>
-          <a:prstGeom prst="rect">
-            <a:avLst/>
-          </a:prstGeom>
-        </p:spPr>
-      </p:pic>
-      <p:sp>
-        <p:nvSpPr>
-          <p:cNvPr id="6" name="Rectángulo 5"/>
-          <p:cNvSpPr/>
-          <p:nvPr/>
-        </p:nvSpPr>
-        <p:spPr>
-          <a:xfrm>
-            <a:off x="1290489" y="648471"/>
-            <a:ext cx="744114" cy="388696"/>
-          </a:xfrm>
-          <a:prstGeom prst="rect">
-            <a:avLst/>
-          </a:prstGeom>
-        </p:spPr>
-        <p:txBody>
-          <a:bodyPr wrap="none">
-            <a:spAutoFit/>
-          </a:bodyPr>
-          <a:lstStyle/>
-          <a:p>
-            <a:pPr>
-              <a:lnSpc>
-                <a:spcPct val="107000"/>
-              </a:lnSpc>
-              <a:spcAft>
-                <a:spcPts val="800"/>
-              </a:spcAft>
-            </a:pPr>
-            <a:r>
-              <a:rPr lang="es-ES_tradnl" b="1" dirty="0">
-                <a:latin typeface="Calibri" panose="020F0502020204030204" pitchFamily="34" charset="0"/>
-                <a:ea typeface="Calibri" panose="020F0502020204030204" pitchFamily="34" charset="0"/>
-                <a:cs typeface="Times New Roman" panose="02020603050405020304" pitchFamily="18" charset="0"/>
-              </a:rPr>
-              <a:t>HTML</a:t>
-            </a:r>
-            <a:endParaRPr lang="es-ES" sz="1400" dirty="0">
-              <a:effectLst/>
-              <a:latin typeface="Calibri" panose="020F0502020204030204" pitchFamily="34" charset="0"/>
-              <a:ea typeface="Calibri" panose="020F0502020204030204" pitchFamily="34" charset="0"/>
-              <a:cs typeface="Times New Roman" panose="02020603050405020304" pitchFamily="18" charset="0"/>
-            </a:endParaRPr>
-          </a:p>
-        </p:txBody>
-      </p:sp>
-    </p:spTree>
-    <p:extLst>
-      <p:ext uri="{BB962C8B-B14F-4D97-AF65-F5344CB8AC3E}">
-        <p14:creationId xmlns:p14="http://schemas.microsoft.com/office/powerpoint/2010/main" val="3017904557"/>
-      </p:ext>
-    </p:extLst>
-  </p:cSld>
-  <p:clrMapOvr>
-    <a:masterClrMapping/>
-  </p:clrMapOvr>
-  <p:timing>
-    <p:tnLst>
-      <p:par>
-        <p:cTn id="1" dur="indefinite" restart="never" nodeType="tmRoot"/>
-      </p:par>
-    </p:tnLst>
-  </p:timing>
-</p:sld>
-</file>
-
-<file path=ppt/slides/slide19.xml><?xml version="1.0" encoding="utf-8"?>
-<p:sld xmlns:a="http://schemas.openxmlformats.org/drawingml/2006/main" xmlns:r="http://schemas.openxmlformats.org/officeDocument/2006/relationships" xmlns:p="http://schemas.openxmlformats.org/presentationml/2006/main">
-  <p:cSld>
-    <p:spTree>
-      <p:nvGrpSpPr>
-        <p:cNvPr id="1" name=""/>
-        <p:cNvGrpSpPr/>
-        <p:nvPr/>
-      </p:nvGrpSpPr>
-      <p:grpSpPr>
-        <a:xfrm>
-          <a:off x="0" y="0"/>
-          <a:ext cx="0" cy="0"/>
-          <a:chOff x="0" y="0"/>
-          <a:chExt cx="0" cy="0"/>
-        </a:xfrm>
-      </p:grpSpPr>
-      <p:pic>
-        <p:nvPicPr>
-          <p:cNvPr id="3" name="Imagen 2"/>
-          <p:cNvPicPr>
-            <a:picLocks noChangeAspect="1"/>
-          </p:cNvPicPr>
-          <p:nvPr/>
-        </p:nvPicPr>
-        <p:blipFill>
-          <a:blip r:embed="rId3">
-            <a:extLst>
-              <a:ext uri="{28A0092B-C50C-407E-A947-70E740481C1C}">
-                <a14:useLocalDpi xmlns:a14="http://schemas.microsoft.com/office/drawing/2010/main" val="0"/>
-              </a:ext>
-            </a:extLst>
-          </a:blip>
-          <a:stretch>
-            <a:fillRect/>
-          </a:stretch>
-        </p:blipFill>
-        <p:spPr>
-          <a:xfrm>
-            <a:off x="2032000" y="889000"/>
-            <a:ext cx="8128000" cy="5080000"/>
-          </a:xfrm>
-          <a:prstGeom prst="rect">
-            <a:avLst/>
-          </a:prstGeom>
-        </p:spPr>
-      </p:pic>
-    </p:spTree>
-    <p:extLst>
-      <p:ext uri="{BB962C8B-B14F-4D97-AF65-F5344CB8AC3E}">
-        <p14:creationId xmlns:p14="http://schemas.microsoft.com/office/powerpoint/2010/main" val="1449880844"/>
       </p:ext>
     </p:extLst>
   </p:cSld>
@@ -10169,6 +10270,246 @@
           <a:chExt cx="0" cy="0"/>
         </a:xfrm>
       </p:grpSpPr>
+      <p:pic>
+        <p:nvPicPr>
+          <p:cNvPr id="3" name="Imagen 2"/>
+          <p:cNvPicPr/>
+          <p:nvPr/>
+        </p:nvPicPr>
+        <p:blipFill>
+          <a:blip r:embed="rId3"/>
+          <a:stretch>
+            <a:fillRect/>
+          </a:stretch>
+        </p:blipFill>
+        <p:spPr>
+          <a:xfrm>
+            <a:off x="6088604" y="1516238"/>
+            <a:ext cx="5400040" cy="3192145"/>
+          </a:xfrm>
+          <a:prstGeom prst="rect">
+            <a:avLst/>
+          </a:prstGeom>
+        </p:spPr>
+      </p:pic>
+      <p:sp>
+        <p:nvSpPr>
+          <p:cNvPr id="4" name="Rectángulo 3"/>
+          <p:cNvSpPr/>
+          <p:nvPr/>
+        </p:nvSpPr>
+        <p:spPr>
+          <a:xfrm>
+            <a:off x="7250001" y="648471"/>
+            <a:ext cx="2125454" cy="388696"/>
+          </a:xfrm>
+          <a:prstGeom prst="rect">
+            <a:avLst/>
+          </a:prstGeom>
+        </p:spPr>
+        <p:txBody>
+          <a:bodyPr wrap="none">
+            <a:spAutoFit/>
+          </a:bodyPr>
+          <a:lstStyle/>
+          <a:p>
+            <a:pPr>
+              <a:lnSpc>
+                <a:spcPct val="107000"/>
+              </a:lnSpc>
+              <a:spcAft>
+                <a:spcPts val="800"/>
+              </a:spcAft>
+            </a:pPr>
+            <a:r>
+              <a:rPr lang="es-ES_tradnl" b="1" dirty="0">
+                <a:latin typeface="Calibri" panose="020F0502020204030204" pitchFamily="34" charset="0"/>
+                <a:ea typeface="Calibri" panose="020F0502020204030204" pitchFamily="34" charset="0"/>
+                <a:cs typeface="Times New Roman" panose="02020603050405020304" pitchFamily="18" charset="0"/>
+              </a:rPr>
+              <a:t>USO DE BOOTSTRAP</a:t>
+            </a:r>
+            <a:endParaRPr lang="es-ES" sz="1400" dirty="0">
+              <a:effectLst/>
+              <a:latin typeface="Calibri" panose="020F0502020204030204" pitchFamily="34" charset="0"/>
+              <a:ea typeface="Calibri" panose="020F0502020204030204" pitchFamily="34" charset="0"/>
+              <a:cs typeface="Times New Roman" panose="02020603050405020304" pitchFamily="18" charset="0"/>
+            </a:endParaRPr>
+          </a:p>
+        </p:txBody>
+      </p:sp>
+      <p:pic>
+        <p:nvPicPr>
+          <p:cNvPr id="5" name="Imagen 4"/>
+          <p:cNvPicPr/>
+          <p:nvPr/>
+        </p:nvPicPr>
+        <p:blipFill>
+          <a:blip r:embed="rId4"/>
+          <a:stretch>
+            <a:fillRect/>
+          </a:stretch>
+        </p:blipFill>
+        <p:spPr>
+          <a:xfrm>
+            <a:off x="209435" y="2170923"/>
+            <a:ext cx="5400040" cy="2537460"/>
+          </a:xfrm>
+          <a:prstGeom prst="rect">
+            <a:avLst/>
+          </a:prstGeom>
+        </p:spPr>
+      </p:pic>
+      <p:sp>
+        <p:nvSpPr>
+          <p:cNvPr id="6" name="Rectángulo 5"/>
+          <p:cNvSpPr/>
+          <p:nvPr/>
+        </p:nvSpPr>
+        <p:spPr>
+          <a:xfrm>
+            <a:off x="1290489" y="648471"/>
+            <a:ext cx="744114" cy="388696"/>
+          </a:xfrm>
+          <a:prstGeom prst="rect">
+            <a:avLst/>
+          </a:prstGeom>
+        </p:spPr>
+        <p:txBody>
+          <a:bodyPr wrap="none">
+            <a:spAutoFit/>
+          </a:bodyPr>
+          <a:lstStyle/>
+          <a:p>
+            <a:pPr>
+              <a:lnSpc>
+                <a:spcPct val="107000"/>
+              </a:lnSpc>
+              <a:spcAft>
+                <a:spcPts val="800"/>
+              </a:spcAft>
+            </a:pPr>
+            <a:r>
+              <a:rPr lang="es-ES_tradnl" b="1" dirty="0">
+                <a:latin typeface="Calibri" panose="020F0502020204030204" pitchFamily="34" charset="0"/>
+                <a:ea typeface="Calibri" panose="020F0502020204030204" pitchFamily="34" charset="0"/>
+                <a:cs typeface="Times New Roman" panose="02020603050405020304" pitchFamily="18" charset="0"/>
+              </a:rPr>
+              <a:t>HTML</a:t>
+            </a:r>
+            <a:endParaRPr lang="es-ES" sz="1400" dirty="0">
+              <a:effectLst/>
+              <a:latin typeface="Calibri" panose="020F0502020204030204" pitchFamily="34" charset="0"/>
+              <a:ea typeface="Calibri" panose="020F0502020204030204" pitchFamily="34" charset="0"/>
+              <a:cs typeface="Times New Roman" panose="02020603050405020304" pitchFamily="18" charset="0"/>
+            </a:endParaRPr>
+          </a:p>
+        </p:txBody>
+      </p:sp>
+    </p:spTree>
+    <p:extLst>
+      <p:ext uri="{BB962C8B-B14F-4D97-AF65-F5344CB8AC3E}">
+        <p14:creationId xmlns:p14="http://schemas.microsoft.com/office/powerpoint/2010/main" val="3017904557"/>
+      </p:ext>
+    </p:extLst>
+  </p:cSld>
+  <p:clrMapOvr>
+    <a:masterClrMapping/>
+  </p:clrMapOvr>
+  <p:timing>
+    <p:tnLst>
+      <p:par>
+        <p:cTn id="1" dur="indefinite" restart="never" nodeType="tmRoot"/>
+      </p:par>
+    </p:tnLst>
+  </p:timing>
+</p:sld>
+</file>
+
+<file path=ppt/slides/slide21.xml><?xml version="1.0" encoding="utf-8"?>
+<p:sld xmlns:a="http://schemas.openxmlformats.org/drawingml/2006/main" xmlns:r="http://schemas.openxmlformats.org/officeDocument/2006/relationships" xmlns:p="http://schemas.openxmlformats.org/presentationml/2006/main">
+  <p:cSld>
+    <p:spTree>
+      <p:nvGrpSpPr>
+        <p:cNvPr id="1" name=""/>
+        <p:cNvGrpSpPr/>
+        <p:nvPr/>
+      </p:nvGrpSpPr>
+      <p:grpSpPr>
+        <a:xfrm>
+          <a:off x="0" y="0"/>
+          <a:ext cx="0" cy="0"/>
+          <a:chOff x="0" y="0"/>
+          <a:chExt cx="0" cy="0"/>
+        </a:xfrm>
+      </p:grpSpPr>
+      <p:pic>
+        <p:nvPicPr>
+          <p:cNvPr id="3" name="Imagen 2"/>
+          <p:cNvPicPr>
+            <a:picLocks noChangeAspect="1"/>
+          </p:cNvPicPr>
+          <p:nvPr/>
+        </p:nvPicPr>
+        <p:blipFill>
+          <a:blip r:embed="rId3">
+            <a:extLst>
+              <a:ext uri="{28A0092B-C50C-407E-A947-70E740481C1C}">
+                <a14:useLocalDpi xmlns:a14="http://schemas.microsoft.com/office/drawing/2010/main" val="0"/>
+              </a:ext>
+            </a:extLst>
+          </a:blip>
+          <a:stretch>
+            <a:fillRect/>
+          </a:stretch>
+        </p:blipFill>
+        <p:spPr>
+          <a:xfrm>
+            <a:off x="2032000" y="889000"/>
+            <a:ext cx="8128000" cy="5080000"/>
+          </a:xfrm>
+          <a:prstGeom prst="rect">
+            <a:avLst/>
+          </a:prstGeom>
+        </p:spPr>
+      </p:pic>
+    </p:spTree>
+    <p:extLst>
+      <p:ext uri="{BB962C8B-B14F-4D97-AF65-F5344CB8AC3E}">
+        <p14:creationId xmlns:p14="http://schemas.microsoft.com/office/powerpoint/2010/main" val="1449880844"/>
+      </p:ext>
+    </p:extLst>
+  </p:cSld>
+  <p:clrMapOvr>
+    <a:masterClrMapping/>
+  </p:clrMapOvr>
+  <p:timing>
+    <p:tnLst>
+      <p:par>
+        <p:cTn id="1" dur="indefinite" restart="never" nodeType="tmRoot"/>
+      </p:par>
+    </p:tnLst>
+  </p:timing>
+</p:sld>
+</file>
+
+<file path=ppt/slides/slide22.xml><?xml version="1.0" encoding="utf-8"?>
+<p:sld xmlns:a="http://schemas.openxmlformats.org/drawingml/2006/main" xmlns:r="http://schemas.openxmlformats.org/officeDocument/2006/relationships" xmlns:p="http://schemas.openxmlformats.org/presentationml/2006/main">
+  <p:cSld>
+    <p:spTree>
+      <p:nvGrpSpPr>
+        <p:cNvPr id="1" name=""/>
+        <p:cNvGrpSpPr/>
+        <p:nvPr/>
+      </p:nvGrpSpPr>
+      <p:grpSpPr>
+        <a:xfrm>
+          <a:off x="0" y="0"/>
+          <a:ext cx="0" cy="0"/>
+          <a:chOff x="0" y="0"/>
+          <a:chExt cx="0" cy="0"/>
+        </a:xfrm>
+      </p:grpSpPr>
       <p:sp>
         <p:nvSpPr>
           <p:cNvPr id="2" name="Rectángulo 1"/>
@@ -10265,7 +10606,7 @@
 </p:sld>
 </file>
 
-<file path=ppt/slides/slide21.xml><?xml version="1.0" encoding="utf-8"?>
+<file path=ppt/slides/slide23.xml><?xml version="1.0" encoding="utf-8"?>
 <p:sld xmlns:a="http://schemas.openxmlformats.org/drawingml/2006/main" xmlns:r="http://schemas.openxmlformats.org/officeDocument/2006/relationships" xmlns:p="http://schemas.openxmlformats.org/presentationml/2006/main">
   <p:cSld>
     <p:spTree>
@@ -10332,7 +10673,7 @@
 </p:sld>
 </file>
 
-<file path=ppt/slides/slide22.xml><?xml version="1.0" encoding="utf-8"?>
+<file path=ppt/slides/slide24.xml><?xml version="1.0" encoding="utf-8"?>
 <p:sld xmlns:a="http://schemas.openxmlformats.org/drawingml/2006/main" xmlns:r="http://schemas.openxmlformats.org/officeDocument/2006/relationships" xmlns:p="http://schemas.openxmlformats.org/presentationml/2006/main">
   <p:cSld>
     <p:spTree>
@@ -10437,7 +10778,7 @@
 </p:sld>
 </file>
 
-<file path=ppt/slides/slide23.xml><?xml version="1.0" encoding="utf-8"?>
+<file path=ppt/slides/slide25.xml><?xml version="1.0" encoding="utf-8"?>
 <p:sld xmlns:a="http://schemas.openxmlformats.org/drawingml/2006/main" xmlns:r="http://schemas.openxmlformats.org/officeDocument/2006/relationships" xmlns:p="http://schemas.openxmlformats.org/presentationml/2006/main">
   <p:cSld>
     <p:spTree>
@@ -10504,7 +10845,7 @@
 </p:sld>
 </file>
 
-<file path=ppt/slides/slide24.xml><?xml version="1.0" encoding="utf-8"?>
+<file path=ppt/slides/slide26.xml><?xml version="1.0" encoding="utf-8"?>
 <p:sld xmlns:a="http://schemas.openxmlformats.org/drawingml/2006/main" xmlns:r="http://schemas.openxmlformats.org/officeDocument/2006/relationships" xmlns:p="http://schemas.openxmlformats.org/presentationml/2006/main">
   <p:cSld>
     <p:spTree>
@@ -10563,7 +10904,7 @@
 </p:sld>
 </file>
 
-<file path=ppt/slides/slide25.xml><?xml version="1.0" encoding="utf-8"?>
+<file path=ppt/slides/slide27.xml><?xml version="1.0" encoding="utf-8"?>
 <p:sld xmlns:a="http://schemas.openxmlformats.org/drawingml/2006/main" xmlns:r="http://schemas.openxmlformats.org/officeDocument/2006/relationships" xmlns:p="http://schemas.openxmlformats.org/presentationml/2006/main">
   <p:cSld>
     <p:spTree>
@@ -10622,7 +10963,7 @@
 </p:sld>
 </file>
 
-<file path=ppt/slides/slide26.xml><?xml version="1.0" encoding="utf-8"?>
+<file path=ppt/slides/slide28.xml><?xml version="1.0" encoding="utf-8"?>
 <p:sld xmlns:a="http://schemas.openxmlformats.org/drawingml/2006/main" xmlns:r="http://schemas.openxmlformats.org/officeDocument/2006/relationships" xmlns:p="http://schemas.openxmlformats.org/presentationml/2006/main">
   <p:cSld>
     <p:spTree>
@@ -10689,7 +11030,7 @@
 </p:sld>
 </file>
 
-<file path=ppt/slides/slide27.xml><?xml version="1.0" encoding="utf-8"?>
+<file path=ppt/slides/slide29.xml><?xml version="1.0" encoding="utf-8"?>
 <p:sld xmlns:a="http://schemas.openxmlformats.org/drawingml/2006/main" xmlns:r="http://schemas.openxmlformats.org/officeDocument/2006/relationships" xmlns:p="http://schemas.openxmlformats.org/presentationml/2006/main">
   <p:cSld>
     <p:spTree>
@@ -10748,7 +11089,123 @@
 </p:sld>
 </file>
 
-<file path=ppt/slides/slide28.xml><?xml version="1.0" encoding="utf-8"?>
+<file path=ppt/slides/slide3.xml><?xml version="1.0" encoding="utf-8"?>
+<p:sld xmlns:a="http://schemas.openxmlformats.org/drawingml/2006/main" xmlns:r="http://schemas.openxmlformats.org/officeDocument/2006/relationships" xmlns:p="http://schemas.openxmlformats.org/presentationml/2006/main">
+  <p:cSld>
+    <p:spTree>
+      <p:nvGrpSpPr>
+        <p:cNvPr id="1" name=""/>
+        <p:cNvGrpSpPr/>
+        <p:nvPr/>
+      </p:nvGrpSpPr>
+      <p:grpSpPr>
+        <a:xfrm>
+          <a:off x="0" y="0"/>
+          <a:ext cx="0" cy="0"/>
+          <a:chOff x="0" y="0"/>
+          <a:chExt cx="0" cy="0"/>
+        </a:xfrm>
+      </p:grpSpPr>
+      <p:sp>
+        <p:nvSpPr>
+          <p:cNvPr id="2" name="Título 1"/>
+          <p:cNvSpPr>
+            <a:spLocks noGrp="1"/>
+          </p:cNvSpPr>
+          <p:nvPr>
+            <p:ph type="title"/>
+          </p:nvPr>
+        </p:nvSpPr>
+        <p:spPr/>
+        <p:txBody>
+          <a:bodyPr/>
+          <a:lstStyle/>
+          <a:p>
+            <a:r>
+              <a:rPr lang="es-ES" dirty="0" err="1" smtClean="0"/>
+              <a:t>YoSoyTuCine</a:t>
+            </a:r>
+            <a:endParaRPr lang="es-ES" dirty="0"/>
+          </a:p>
+        </p:txBody>
+      </p:sp>
+      <p:sp>
+        <p:nvSpPr>
+          <p:cNvPr id="3" name="Marcador de contenido 2"/>
+          <p:cNvSpPr>
+            <a:spLocks noGrp="1"/>
+          </p:cNvSpPr>
+          <p:nvPr>
+            <p:ph idx="1"/>
+          </p:nvPr>
+        </p:nvSpPr>
+        <p:spPr/>
+        <p:txBody>
+          <a:bodyPr/>
+          <a:lstStyle/>
+          <a:p>
+            <a:r>
+              <a:rPr lang="es-ES_tradnl" dirty="0" smtClean="0"/>
+              <a:t>Comparador de cines.</a:t>
+            </a:r>
+          </a:p>
+          <a:p>
+            <a:endParaRPr lang="es-ES" dirty="0"/>
+          </a:p>
+          <a:p>
+            <a:r>
+              <a:rPr lang="es-ES_tradnl" dirty="0" smtClean="0"/>
+              <a:t>Cine más cercano en todo momento.</a:t>
+            </a:r>
+          </a:p>
+          <a:p>
+            <a:endParaRPr lang="es-ES" dirty="0"/>
+          </a:p>
+          <a:p>
+            <a:r>
+              <a:rPr lang="es-ES_tradnl" dirty="0" smtClean="0"/>
+              <a:t>Elige además en base de las </a:t>
+            </a:r>
+            <a:r>
+              <a:rPr lang="es-ES_tradnl" dirty="0"/>
+              <a:t>valoraciones dadas a los cines por la comunidad de usuarios de </a:t>
+            </a:r>
+            <a:r>
+              <a:rPr lang="es-ES_tradnl" dirty="0" err="1"/>
+              <a:t>YoSoyTuCine</a:t>
+            </a:r>
+            <a:r>
+              <a:rPr lang="es-ES_tradnl" dirty="0"/>
+              <a:t>.</a:t>
+            </a:r>
+            <a:endParaRPr lang="es-ES" dirty="0"/>
+          </a:p>
+          <a:p>
+            <a:endParaRPr lang="es-ES" dirty="0"/>
+          </a:p>
+        </p:txBody>
+      </p:sp>
+    </p:spTree>
+    <p:extLst>
+      <p:ext uri="{BB962C8B-B14F-4D97-AF65-F5344CB8AC3E}">
+        <p14:creationId xmlns:p14="http://schemas.microsoft.com/office/powerpoint/2010/main" val="3242723743"/>
+      </p:ext>
+    </p:extLst>
+  </p:cSld>
+  <p:clrMapOvr>
+    <a:masterClrMapping/>
+  </p:clrMapOvr>
+  <p:timing>
+    <p:tnLst>
+      <p:par>
+        <p:cTn id="1" dur="indefinite" restart="never" nodeType="tmRoot"/>
+      </p:par>
+    </p:tnLst>
+  </p:timing>
+</p:sld>
+</file>
+
+<file path=ppt/slides/slide30.xml><?xml version="1.0" encoding="utf-8"?>
 <p:sld xmlns:a="http://schemas.openxmlformats.org/drawingml/2006/main" xmlns:r="http://schemas.openxmlformats.org/officeDocument/2006/relationships" xmlns:p="http://schemas.openxmlformats.org/presentationml/2006/main">
   <p:cSld>
     <p:spTree>
@@ -10809,7 +11266,7 @@
 </p:sld>
 </file>
 
-<file path=ppt/slides/slide29.xml><?xml version="1.0" encoding="utf-8"?>
+<file path=ppt/slides/slide31.xml><?xml version="1.0" encoding="utf-8"?>
 <p:sld xmlns:a="http://schemas.openxmlformats.org/drawingml/2006/main" xmlns:r="http://schemas.openxmlformats.org/officeDocument/2006/relationships" xmlns:p="http://schemas.openxmlformats.org/presentationml/2006/main">
   <p:cSld>
     <p:spTree>
@@ -10898,123 +11355,7 @@
 </p:sld>
 </file>
 
-<file path=ppt/slides/slide3.xml><?xml version="1.0" encoding="utf-8"?>
-<p:sld xmlns:a="http://schemas.openxmlformats.org/drawingml/2006/main" xmlns:r="http://schemas.openxmlformats.org/officeDocument/2006/relationships" xmlns:p="http://schemas.openxmlformats.org/presentationml/2006/main">
-  <p:cSld>
-    <p:spTree>
-      <p:nvGrpSpPr>
-        <p:cNvPr id="1" name=""/>
-        <p:cNvGrpSpPr/>
-        <p:nvPr/>
-      </p:nvGrpSpPr>
-      <p:grpSpPr>
-        <a:xfrm>
-          <a:off x="0" y="0"/>
-          <a:ext cx="0" cy="0"/>
-          <a:chOff x="0" y="0"/>
-          <a:chExt cx="0" cy="0"/>
-        </a:xfrm>
-      </p:grpSpPr>
-      <p:sp>
-        <p:nvSpPr>
-          <p:cNvPr id="2" name="Título 1"/>
-          <p:cNvSpPr>
-            <a:spLocks noGrp="1"/>
-          </p:cNvSpPr>
-          <p:nvPr>
-            <p:ph type="title"/>
-          </p:nvPr>
-        </p:nvSpPr>
-        <p:spPr/>
-        <p:txBody>
-          <a:bodyPr/>
-          <a:lstStyle/>
-          <a:p>
-            <a:r>
-              <a:rPr lang="es-ES" dirty="0" err="1" smtClean="0"/>
-              <a:t>YoSoyTuCine</a:t>
-            </a:r>
-            <a:endParaRPr lang="es-ES" dirty="0"/>
-          </a:p>
-        </p:txBody>
-      </p:sp>
-      <p:sp>
-        <p:nvSpPr>
-          <p:cNvPr id="3" name="Marcador de contenido 2"/>
-          <p:cNvSpPr>
-            <a:spLocks noGrp="1"/>
-          </p:cNvSpPr>
-          <p:nvPr>
-            <p:ph idx="1"/>
-          </p:nvPr>
-        </p:nvSpPr>
-        <p:spPr/>
-        <p:txBody>
-          <a:bodyPr/>
-          <a:lstStyle/>
-          <a:p>
-            <a:r>
-              <a:rPr lang="es-ES_tradnl" dirty="0" smtClean="0"/>
-              <a:t>Comparador de cines.</a:t>
-            </a:r>
-          </a:p>
-          <a:p>
-            <a:endParaRPr lang="es-ES" dirty="0"/>
-          </a:p>
-          <a:p>
-            <a:r>
-              <a:rPr lang="es-ES_tradnl" dirty="0" smtClean="0"/>
-              <a:t>Cine más cercano en todo momento.</a:t>
-            </a:r>
-          </a:p>
-          <a:p>
-            <a:endParaRPr lang="es-ES" dirty="0"/>
-          </a:p>
-          <a:p>
-            <a:r>
-              <a:rPr lang="es-ES_tradnl" dirty="0" smtClean="0"/>
-              <a:t>Elige además en base de las </a:t>
-            </a:r>
-            <a:r>
-              <a:rPr lang="es-ES_tradnl" dirty="0"/>
-              <a:t>valoraciones dadas a los cines por la comunidad de usuarios de </a:t>
-            </a:r>
-            <a:r>
-              <a:rPr lang="es-ES_tradnl" dirty="0" err="1"/>
-              <a:t>YoSoyTuCine</a:t>
-            </a:r>
-            <a:r>
-              <a:rPr lang="es-ES_tradnl" dirty="0"/>
-              <a:t>.</a:t>
-            </a:r>
-            <a:endParaRPr lang="es-ES" dirty="0"/>
-          </a:p>
-          <a:p>
-            <a:endParaRPr lang="es-ES" dirty="0"/>
-          </a:p>
-        </p:txBody>
-      </p:sp>
-    </p:spTree>
-    <p:extLst>
-      <p:ext uri="{BB962C8B-B14F-4D97-AF65-F5344CB8AC3E}">
-        <p14:creationId xmlns:p14="http://schemas.microsoft.com/office/powerpoint/2010/main" val="3242723743"/>
-      </p:ext>
-    </p:extLst>
-  </p:cSld>
-  <p:clrMapOvr>
-    <a:masterClrMapping/>
-  </p:clrMapOvr>
-  <p:timing>
-    <p:tnLst>
-      <p:par>
-        <p:cTn id="1" dur="indefinite" restart="never" nodeType="tmRoot"/>
-      </p:par>
-    </p:tnLst>
-  </p:timing>
-</p:sld>
-</file>
-
-<file path=ppt/slides/slide30.xml><?xml version="1.0" encoding="utf-8"?>
+<file path=ppt/slides/slide32.xml><?xml version="1.0" encoding="utf-8"?>
 <p:sld xmlns:a="http://schemas.openxmlformats.org/drawingml/2006/main" xmlns:r="http://schemas.openxmlformats.org/officeDocument/2006/relationships" xmlns:p="http://schemas.openxmlformats.org/presentationml/2006/main">
   <p:cSld>
     <p:spTree>
@@ -11110,7 +11451,7 @@
 </p:sld>
 </file>
 
-<file path=ppt/slides/slide31.xml><?xml version="1.0" encoding="utf-8"?>
+<file path=ppt/slides/slide33.xml><?xml version="1.0" encoding="utf-8"?>
 <p:sld xmlns:a="http://schemas.openxmlformats.org/drawingml/2006/main" xmlns:r="http://schemas.openxmlformats.org/officeDocument/2006/relationships" xmlns:p="http://schemas.openxmlformats.org/presentationml/2006/main">
   <p:cSld>
     <p:spTree>

</xml_diff>